<commit_message>
Updated diagram for PID controller class hiearchy
</commit_message>
<xml_diff>
--- a/extras/media/pidcontrollers.pptx
+++ b/extras/media/pidcontrollers.pptx
@@ -1,19 +1,114 @@
 
 <file path=ppt/presentation.xml><?xml version="1.0" encoding="utf-8"?>
-<p:presentation xmlns:a="http://schemas.openxmlformats.org/drawingml/2006/main" xmlns:p="http://schemas.openxmlformats.org/presentationml/2006/main" xmlns:r="http://schemas.openxmlformats.org/officeDocument/2006/relationships" xmlns:p14="http://schemas.microsoft.com/office/powerpoint/2010/main" xmlns:p15="http://schemas.microsoft.com/office/powerpoint/2012/main" xmlns:mc="http://schemas.openxmlformats.org/markup-compatibility/2006">
+<p:presentation xmlns:a="http://schemas.openxmlformats.org/drawingml/2006/main" xmlns:r="http://schemas.openxmlformats.org/officeDocument/2006/relationships" xmlns:p="http://schemas.openxmlformats.org/presentationml/2006/main">
   <p:sldMasterIdLst>
-    <p:sldMasterId id="2147483648" r:id="rId2"/>
+    <p:sldMasterId id="2147483648" r:id="rId1"/>
   </p:sldMasterIdLst>
   <p:sldIdLst>
-    <p:sldId id="256" r:id="rId3"/>
+    <p:sldId id="256" r:id="rId2"/>
   </p:sldIdLst>
   <p:sldSz cx="10080625" cy="7559675"/>
   <p:notesSz cx="7772400" cy="10058400"/>
+  <p:defaultTextStyle>
+    <a:defPPr>
+      <a:defRPr lang="en-US"/>
+    </a:defPPr>
+    <a:lvl1pPr marL="0" algn="l" defTabSz="914400" rtl="0" eaLnBrk="1" latinLnBrk="0" hangingPunct="1">
+      <a:defRPr sz="1800" kern="1200">
+        <a:solidFill>
+          <a:schemeClr val="tx1"/>
+        </a:solidFill>
+        <a:latin typeface="+mn-lt"/>
+        <a:ea typeface="+mn-ea"/>
+        <a:cs typeface="+mn-cs"/>
+      </a:defRPr>
+    </a:lvl1pPr>
+    <a:lvl2pPr marL="457200" algn="l" defTabSz="914400" rtl="0" eaLnBrk="1" latinLnBrk="0" hangingPunct="1">
+      <a:defRPr sz="1800" kern="1200">
+        <a:solidFill>
+          <a:schemeClr val="tx1"/>
+        </a:solidFill>
+        <a:latin typeface="+mn-lt"/>
+        <a:ea typeface="+mn-ea"/>
+        <a:cs typeface="+mn-cs"/>
+      </a:defRPr>
+    </a:lvl2pPr>
+    <a:lvl3pPr marL="914400" algn="l" defTabSz="914400" rtl="0" eaLnBrk="1" latinLnBrk="0" hangingPunct="1">
+      <a:defRPr sz="1800" kern="1200">
+        <a:solidFill>
+          <a:schemeClr val="tx1"/>
+        </a:solidFill>
+        <a:latin typeface="+mn-lt"/>
+        <a:ea typeface="+mn-ea"/>
+        <a:cs typeface="+mn-cs"/>
+      </a:defRPr>
+    </a:lvl3pPr>
+    <a:lvl4pPr marL="1371600" algn="l" defTabSz="914400" rtl="0" eaLnBrk="1" latinLnBrk="0" hangingPunct="1">
+      <a:defRPr sz="1800" kern="1200">
+        <a:solidFill>
+          <a:schemeClr val="tx1"/>
+        </a:solidFill>
+        <a:latin typeface="+mn-lt"/>
+        <a:ea typeface="+mn-ea"/>
+        <a:cs typeface="+mn-cs"/>
+      </a:defRPr>
+    </a:lvl4pPr>
+    <a:lvl5pPr marL="1828800" algn="l" defTabSz="914400" rtl="0" eaLnBrk="1" latinLnBrk="0" hangingPunct="1">
+      <a:defRPr sz="1800" kern="1200">
+        <a:solidFill>
+          <a:schemeClr val="tx1"/>
+        </a:solidFill>
+        <a:latin typeface="+mn-lt"/>
+        <a:ea typeface="+mn-ea"/>
+        <a:cs typeface="+mn-cs"/>
+      </a:defRPr>
+    </a:lvl5pPr>
+    <a:lvl6pPr marL="2286000" algn="l" defTabSz="914400" rtl="0" eaLnBrk="1" latinLnBrk="0" hangingPunct="1">
+      <a:defRPr sz="1800" kern="1200">
+        <a:solidFill>
+          <a:schemeClr val="tx1"/>
+        </a:solidFill>
+        <a:latin typeface="+mn-lt"/>
+        <a:ea typeface="+mn-ea"/>
+        <a:cs typeface="+mn-cs"/>
+      </a:defRPr>
+    </a:lvl6pPr>
+    <a:lvl7pPr marL="2743200" algn="l" defTabSz="914400" rtl="0" eaLnBrk="1" latinLnBrk="0" hangingPunct="1">
+      <a:defRPr sz="1800" kern="1200">
+        <a:solidFill>
+          <a:schemeClr val="tx1"/>
+        </a:solidFill>
+        <a:latin typeface="+mn-lt"/>
+        <a:ea typeface="+mn-ea"/>
+        <a:cs typeface="+mn-cs"/>
+      </a:defRPr>
+    </a:lvl7pPr>
+    <a:lvl8pPr marL="3200400" algn="l" defTabSz="914400" rtl="0" eaLnBrk="1" latinLnBrk="0" hangingPunct="1">
+      <a:defRPr sz="1800" kern="1200">
+        <a:solidFill>
+          <a:schemeClr val="tx1"/>
+        </a:solidFill>
+        <a:latin typeface="+mn-lt"/>
+        <a:ea typeface="+mn-ea"/>
+        <a:cs typeface="+mn-cs"/>
+      </a:defRPr>
+    </a:lvl8pPr>
+    <a:lvl9pPr marL="3657600" algn="l" defTabSz="914400" rtl="0" eaLnBrk="1" latinLnBrk="0" hangingPunct="1">
+      <a:defRPr sz="1800" kern="1200">
+        <a:solidFill>
+          <a:schemeClr val="tx1"/>
+        </a:solidFill>
+        <a:latin typeface="+mn-lt"/>
+        <a:ea typeface="+mn-ea"/>
+        <a:cs typeface="+mn-cs"/>
+      </a:defRPr>
+    </a:lvl9pPr>
+  </p:defaultTextStyle>
 </p:presentation>
 </file>
 
 <file path=ppt/slideLayouts/slideLayout1.xml><?xml version="1.0" encoding="utf-8"?>
-<p:sldLayout xmlns:a="http://schemas.openxmlformats.org/drawingml/2006/main" xmlns:p="http://schemas.openxmlformats.org/presentationml/2006/main" xmlns:r="http://schemas.openxmlformats.org/officeDocument/2006/relationships" xmlns:p14="http://schemas.microsoft.com/office/powerpoint/2010/main" xmlns:p15="http://schemas.microsoft.com/office/powerpoint/2012/main" xmlns:mc="http://schemas.openxmlformats.org/markup-compatibility/2006" type="blank" preserve="1">
+<p:sldLayout xmlns:a="http://schemas.openxmlformats.org/drawingml/2006/main" xmlns:r="http://schemas.openxmlformats.org/officeDocument/2006/relationships" xmlns:p="http://schemas.openxmlformats.org/presentationml/2006/main" type="blank" preserve="1">
   <p:cSld name="Blank Slide">
     <p:spTree>
       <p:nvGrpSpPr>
@@ -31,11 +126,14 @@
       </p:grpSpPr>
     </p:spTree>
   </p:cSld>
+  <p:clrMapOvr>
+    <a:masterClrMapping/>
+  </p:clrMapOvr>
 </p:sldLayout>
 </file>
 
 <file path=ppt/slideLayouts/slideLayout10.xml><?xml version="1.0" encoding="utf-8"?>
-<p:sldLayout xmlns:a="http://schemas.openxmlformats.org/drawingml/2006/main" xmlns:p="http://schemas.openxmlformats.org/presentationml/2006/main" xmlns:r="http://schemas.openxmlformats.org/officeDocument/2006/relationships" xmlns:p14="http://schemas.microsoft.com/office/powerpoint/2010/main" xmlns:p15="http://schemas.microsoft.com/office/powerpoint/2012/main" xmlns:mc="http://schemas.openxmlformats.org/markup-compatibility/2006" type="objOverTx" preserve="1">
+<p:sldLayout xmlns:a="http://schemas.openxmlformats.org/drawingml/2006/main" xmlns:r="http://schemas.openxmlformats.org/officeDocument/2006/relationships" xmlns:p="http://schemas.openxmlformats.org/presentationml/2006/main" type="objOverTx" preserve="1">
   <p:cSld name="Title, Content over Content">
     <p:spTree>
       <p:nvGrpSpPr>
@@ -71,16 +169,17 @@
           </a:prstGeom>
         </p:spPr>
         <p:txBody>
-          <a:bodyPr lIns="0" rIns="0" tIns="0" bIns="0" anchor="ctr"/>
+          <a:bodyPr lIns="0" tIns="0" rIns="0" bIns="0" anchor="ctr"/>
+          <a:lstStyle/>
           <a:p>
             <a:pPr algn="ctr"/>
-            <a:endParaRPr b="0" lang="en-US" sz="4400" spc="-1" strike="noStrike">
-              <a:solidFill>
-                <a:srgbClr val="000000"/>
-              </a:solidFill>
-              <a:uFill>
-                <a:solidFill>
-                  <a:srgbClr val="ffffff"/>
+            <a:endParaRPr lang="en-US" sz="4400" b="0" strike="noStrike" spc="-1">
+              <a:solidFill>
+                <a:srgbClr val="000000"/>
+              </a:solidFill>
+              <a:uFill>
+                <a:solidFill>
+                  <a:srgbClr val="FFFFFF"/>
                 </a:solidFill>
               </a:uFill>
               <a:latin typeface="Arial"/>
@@ -108,15 +207,16 @@
           </a:prstGeom>
         </p:spPr>
         <p:txBody>
-          <a:bodyPr lIns="0" rIns="0" tIns="0" bIns="0"/>
-          <a:p>
-            <a:endParaRPr b="0" lang="en-US" sz="3200" spc="-1" strike="noStrike">
-              <a:solidFill>
-                <a:srgbClr val="000000"/>
-              </a:solidFill>
-              <a:uFill>
-                <a:solidFill>
-                  <a:srgbClr val="ffffff"/>
+          <a:bodyPr lIns="0" tIns="0" rIns="0" bIns="0"/>
+          <a:lstStyle/>
+          <a:p>
+            <a:endParaRPr lang="en-US" sz="3200" b="0" strike="noStrike" spc="-1">
+              <a:solidFill>
+                <a:srgbClr val="000000"/>
+              </a:solidFill>
+              <a:uFill>
+                <a:solidFill>
+                  <a:srgbClr val="FFFFFF"/>
                 </a:solidFill>
               </a:uFill>
               <a:latin typeface="Arial"/>
@@ -144,15 +244,16 @@
           </a:prstGeom>
         </p:spPr>
         <p:txBody>
-          <a:bodyPr lIns="0" rIns="0" tIns="0" bIns="0"/>
-          <a:p>
-            <a:endParaRPr b="0" lang="en-US" sz="3200" spc="-1" strike="noStrike">
-              <a:solidFill>
-                <a:srgbClr val="000000"/>
-              </a:solidFill>
-              <a:uFill>
-                <a:solidFill>
-                  <a:srgbClr val="ffffff"/>
+          <a:bodyPr lIns="0" tIns="0" rIns="0" bIns="0"/>
+          <a:lstStyle/>
+          <a:p>
+            <a:endParaRPr lang="en-US" sz="3200" b="0" strike="noStrike" spc="-1">
+              <a:solidFill>
+                <a:srgbClr val="000000"/>
+              </a:solidFill>
+              <a:uFill>
+                <a:solidFill>
+                  <a:srgbClr val="FFFFFF"/>
                 </a:solidFill>
               </a:uFill>
               <a:latin typeface="Arial"/>
@@ -162,11 +263,14 @@
       </p:sp>
     </p:spTree>
   </p:cSld>
+  <p:clrMapOvr>
+    <a:masterClrMapping/>
+  </p:clrMapOvr>
 </p:sldLayout>
 </file>
 
 <file path=ppt/slideLayouts/slideLayout11.xml><?xml version="1.0" encoding="utf-8"?>
-<p:sldLayout xmlns:a="http://schemas.openxmlformats.org/drawingml/2006/main" xmlns:p="http://schemas.openxmlformats.org/presentationml/2006/main" xmlns:r="http://schemas.openxmlformats.org/officeDocument/2006/relationships" xmlns:p14="http://schemas.microsoft.com/office/powerpoint/2010/main" xmlns:p15="http://schemas.microsoft.com/office/powerpoint/2012/main" xmlns:mc="http://schemas.openxmlformats.org/markup-compatibility/2006" type="fourObj" preserve="1">
+<p:sldLayout xmlns:a="http://schemas.openxmlformats.org/drawingml/2006/main" xmlns:r="http://schemas.openxmlformats.org/officeDocument/2006/relationships" xmlns:p="http://schemas.openxmlformats.org/presentationml/2006/main" type="fourObj" preserve="1">
   <p:cSld name="Title, 4 Content">
     <p:spTree>
       <p:nvGrpSpPr>
@@ -202,16 +306,17 @@
           </a:prstGeom>
         </p:spPr>
         <p:txBody>
-          <a:bodyPr lIns="0" rIns="0" tIns="0" bIns="0" anchor="ctr"/>
+          <a:bodyPr lIns="0" tIns="0" rIns="0" bIns="0" anchor="ctr"/>
+          <a:lstStyle/>
           <a:p>
             <a:pPr algn="ctr"/>
-            <a:endParaRPr b="0" lang="en-US" sz="4400" spc="-1" strike="noStrike">
-              <a:solidFill>
-                <a:srgbClr val="000000"/>
-              </a:solidFill>
-              <a:uFill>
-                <a:solidFill>
-                  <a:srgbClr val="ffffff"/>
+            <a:endParaRPr lang="en-US" sz="4400" b="0" strike="noStrike" spc="-1">
+              <a:solidFill>
+                <a:srgbClr val="000000"/>
+              </a:solidFill>
+              <a:uFill>
+                <a:solidFill>
+                  <a:srgbClr val="FFFFFF"/>
                 </a:solidFill>
               </a:uFill>
               <a:latin typeface="Arial"/>
@@ -239,15 +344,16 @@
           </a:prstGeom>
         </p:spPr>
         <p:txBody>
-          <a:bodyPr lIns="0" rIns="0" tIns="0" bIns="0"/>
-          <a:p>
-            <a:endParaRPr b="0" lang="en-US" sz="3200" spc="-1" strike="noStrike">
-              <a:solidFill>
-                <a:srgbClr val="000000"/>
-              </a:solidFill>
-              <a:uFill>
-                <a:solidFill>
-                  <a:srgbClr val="ffffff"/>
+          <a:bodyPr lIns="0" tIns="0" rIns="0" bIns="0"/>
+          <a:lstStyle/>
+          <a:p>
+            <a:endParaRPr lang="en-US" sz="3200" b="0" strike="noStrike" spc="-1">
+              <a:solidFill>
+                <a:srgbClr val="000000"/>
+              </a:solidFill>
+              <a:uFill>
+                <a:solidFill>
+                  <a:srgbClr val="FFFFFF"/>
                 </a:solidFill>
               </a:uFill>
               <a:latin typeface="Arial"/>
@@ -275,15 +381,16 @@
           </a:prstGeom>
         </p:spPr>
         <p:txBody>
-          <a:bodyPr lIns="0" rIns="0" tIns="0" bIns="0"/>
-          <a:p>
-            <a:endParaRPr b="0" lang="en-US" sz="3200" spc="-1" strike="noStrike">
-              <a:solidFill>
-                <a:srgbClr val="000000"/>
-              </a:solidFill>
-              <a:uFill>
-                <a:solidFill>
-                  <a:srgbClr val="ffffff"/>
+          <a:bodyPr lIns="0" tIns="0" rIns="0" bIns="0"/>
+          <a:lstStyle/>
+          <a:p>
+            <a:endParaRPr lang="en-US" sz="3200" b="0" strike="noStrike" spc="-1">
+              <a:solidFill>
+                <a:srgbClr val="000000"/>
+              </a:solidFill>
+              <a:uFill>
+                <a:solidFill>
+                  <a:srgbClr val="FFFFFF"/>
                 </a:solidFill>
               </a:uFill>
               <a:latin typeface="Arial"/>
@@ -311,15 +418,16 @@
           </a:prstGeom>
         </p:spPr>
         <p:txBody>
-          <a:bodyPr lIns="0" rIns="0" tIns="0" bIns="0"/>
-          <a:p>
-            <a:endParaRPr b="0" lang="en-US" sz="3200" spc="-1" strike="noStrike">
-              <a:solidFill>
-                <a:srgbClr val="000000"/>
-              </a:solidFill>
-              <a:uFill>
-                <a:solidFill>
-                  <a:srgbClr val="ffffff"/>
+          <a:bodyPr lIns="0" tIns="0" rIns="0" bIns="0"/>
+          <a:lstStyle/>
+          <a:p>
+            <a:endParaRPr lang="en-US" sz="3200" b="0" strike="noStrike" spc="-1">
+              <a:solidFill>
+                <a:srgbClr val="000000"/>
+              </a:solidFill>
+              <a:uFill>
+                <a:solidFill>
+                  <a:srgbClr val="FFFFFF"/>
                 </a:solidFill>
               </a:uFill>
               <a:latin typeface="Arial"/>
@@ -347,15 +455,16 @@
           </a:prstGeom>
         </p:spPr>
         <p:txBody>
-          <a:bodyPr lIns="0" rIns="0" tIns="0" bIns="0"/>
-          <a:p>
-            <a:endParaRPr b="0" lang="en-US" sz="3200" spc="-1" strike="noStrike">
-              <a:solidFill>
-                <a:srgbClr val="000000"/>
-              </a:solidFill>
-              <a:uFill>
-                <a:solidFill>
-                  <a:srgbClr val="ffffff"/>
+          <a:bodyPr lIns="0" tIns="0" rIns="0" bIns="0"/>
+          <a:lstStyle/>
+          <a:p>
+            <a:endParaRPr lang="en-US" sz="3200" b="0" strike="noStrike" spc="-1">
+              <a:solidFill>
+                <a:srgbClr val="000000"/>
+              </a:solidFill>
+              <a:uFill>
+                <a:solidFill>
+                  <a:srgbClr val="FFFFFF"/>
                 </a:solidFill>
               </a:uFill>
               <a:latin typeface="Arial"/>
@@ -365,11 +474,14 @@
       </p:sp>
     </p:spTree>
   </p:cSld>
+  <p:clrMapOvr>
+    <a:masterClrMapping/>
+  </p:clrMapOvr>
 </p:sldLayout>
 </file>
 
 <file path=ppt/slideLayouts/slideLayout12.xml><?xml version="1.0" encoding="utf-8"?>
-<p:sldLayout xmlns:a="http://schemas.openxmlformats.org/drawingml/2006/main" xmlns:p="http://schemas.openxmlformats.org/presentationml/2006/main" xmlns:r="http://schemas.openxmlformats.org/officeDocument/2006/relationships" xmlns:p14="http://schemas.microsoft.com/office/powerpoint/2010/main" xmlns:p15="http://schemas.microsoft.com/office/powerpoint/2012/main" xmlns:mc="http://schemas.openxmlformats.org/markup-compatibility/2006" type="blank" preserve="1">
+<p:sldLayout xmlns:a="http://schemas.openxmlformats.org/drawingml/2006/main" xmlns:r="http://schemas.openxmlformats.org/officeDocument/2006/relationships" xmlns:p="http://schemas.openxmlformats.org/presentationml/2006/main" type="blank" preserve="1">
   <p:cSld name="Title, 6 Content">
     <p:spTree>
       <p:nvGrpSpPr>
@@ -405,16 +517,17 @@
           </a:prstGeom>
         </p:spPr>
         <p:txBody>
-          <a:bodyPr lIns="0" rIns="0" tIns="0" bIns="0" anchor="ctr"/>
+          <a:bodyPr lIns="0" tIns="0" rIns="0" bIns="0" anchor="ctr"/>
+          <a:lstStyle/>
           <a:p>
             <a:pPr algn="ctr"/>
-            <a:endParaRPr b="0" lang="en-US" sz="4400" spc="-1" strike="noStrike">
-              <a:solidFill>
-                <a:srgbClr val="000000"/>
-              </a:solidFill>
-              <a:uFill>
-                <a:solidFill>
-                  <a:srgbClr val="ffffff"/>
+            <a:endParaRPr lang="en-US" sz="4400" b="0" strike="noStrike" spc="-1">
+              <a:solidFill>
+                <a:srgbClr val="000000"/>
+              </a:solidFill>
+              <a:uFill>
+                <a:solidFill>
+                  <a:srgbClr val="FFFFFF"/>
                 </a:solidFill>
               </a:uFill>
               <a:latin typeface="Arial"/>
@@ -442,15 +555,16 @@
           </a:prstGeom>
         </p:spPr>
         <p:txBody>
-          <a:bodyPr lIns="0" rIns="0" tIns="0" bIns="0"/>
-          <a:p>
-            <a:endParaRPr b="0" lang="en-US" sz="3200" spc="-1" strike="noStrike">
-              <a:solidFill>
-                <a:srgbClr val="000000"/>
-              </a:solidFill>
-              <a:uFill>
-                <a:solidFill>
-                  <a:srgbClr val="ffffff"/>
+          <a:bodyPr lIns="0" tIns="0" rIns="0" bIns="0"/>
+          <a:lstStyle/>
+          <a:p>
+            <a:endParaRPr lang="en-US" sz="3200" b="0" strike="noStrike" spc="-1">
+              <a:solidFill>
+                <a:srgbClr val="000000"/>
+              </a:solidFill>
+              <a:uFill>
+                <a:solidFill>
+                  <a:srgbClr val="FFFFFF"/>
                 </a:solidFill>
               </a:uFill>
               <a:latin typeface="Arial"/>
@@ -478,15 +592,16 @@
           </a:prstGeom>
         </p:spPr>
         <p:txBody>
-          <a:bodyPr lIns="0" rIns="0" tIns="0" bIns="0"/>
-          <a:p>
-            <a:endParaRPr b="0" lang="en-US" sz="3200" spc="-1" strike="noStrike">
-              <a:solidFill>
-                <a:srgbClr val="000000"/>
-              </a:solidFill>
-              <a:uFill>
-                <a:solidFill>
-                  <a:srgbClr val="ffffff"/>
+          <a:bodyPr lIns="0" tIns="0" rIns="0" bIns="0"/>
+          <a:lstStyle/>
+          <a:p>
+            <a:endParaRPr lang="en-US" sz="3200" b="0" strike="noStrike" spc="-1">
+              <a:solidFill>
+                <a:srgbClr val="000000"/>
+              </a:solidFill>
+              <a:uFill>
+                <a:solidFill>
+                  <a:srgbClr val="FFFFFF"/>
                 </a:solidFill>
               </a:uFill>
               <a:latin typeface="Arial"/>
@@ -496,7 +611,7 @@
       </p:sp>
       <p:pic>
         <p:nvPicPr>
-          <p:cNvPr id="32" name="" descr=""/>
+          <p:cNvPr id="32" name="Picture 31"/>
           <p:cNvPicPr/>
           <p:nvPr/>
         </p:nvPicPr>
@@ -519,12 +634,12 @@
       </p:pic>
       <p:pic>
         <p:nvPicPr>
-          <p:cNvPr id="33" name="" descr=""/>
+          <p:cNvPr id="33" name="Picture 32"/>
           <p:cNvPicPr/>
           <p:nvPr/>
         </p:nvPicPr>
         <p:blipFill>
-          <a:blip r:embed="rId3"/>
+          <a:blip r:embed="rId2"/>
           <a:stretch/>
         </p:blipFill>
         <p:spPr>
@@ -542,11 +657,14 @@
       </p:pic>
     </p:spTree>
   </p:cSld>
+  <p:clrMapOvr>
+    <a:masterClrMapping/>
+  </p:clrMapOvr>
 </p:sldLayout>
 </file>
 
 <file path=ppt/slideLayouts/slideLayout2.xml><?xml version="1.0" encoding="utf-8"?>
-<p:sldLayout xmlns:a="http://schemas.openxmlformats.org/drawingml/2006/main" xmlns:p="http://schemas.openxmlformats.org/presentationml/2006/main" xmlns:r="http://schemas.openxmlformats.org/officeDocument/2006/relationships" xmlns:p14="http://schemas.microsoft.com/office/powerpoint/2010/main" xmlns:p15="http://schemas.microsoft.com/office/powerpoint/2012/main" xmlns:mc="http://schemas.openxmlformats.org/markup-compatibility/2006" type="tx" preserve="1">
+<p:sldLayout xmlns:a="http://schemas.openxmlformats.org/drawingml/2006/main" xmlns:r="http://schemas.openxmlformats.org/officeDocument/2006/relationships" xmlns:p="http://schemas.openxmlformats.org/presentationml/2006/main" type="tx" preserve="1">
   <p:cSld name="Title Slide">
     <p:spTree>
       <p:nvGrpSpPr>
@@ -564,7 +682,7 @@
       </p:grpSpPr>
       <p:sp>
         <p:nvSpPr>
-          <p:cNvPr id="0" name="PlaceHolder 1"/>
+          <p:cNvPr id="2" name="PlaceHolder 1"/>
           <p:cNvSpPr>
             <a:spLocks noGrp="1"/>
           </p:cNvSpPr>
@@ -582,26 +700,27 @@
           </a:prstGeom>
         </p:spPr>
         <p:txBody>
-          <a:bodyPr lIns="0" rIns="0" tIns="0" bIns="0" anchor="ctr"/>
+          <a:bodyPr lIns="0" tIns="0" rIns="0" bIns="0" anchor="ctr"/>
+          <a:lstStyle/>
           <a:p>
             <a:pPr algn="ctr"/>
-            <a:endParaRPr b="0" lang="en-US" sz="4400" spc="-1" strike="noStrike">
-              <a:solidFill>
-                <a:srgbClr val="000000"/>
-              </a:solidFill>
-              <a:uFill>
-                <a:solidFill>
-                  <a:srgbClr val="ffffff"/>
-                </a:solidFill>
-              </a:uFill>
-              <a:latin typeface="Arial"/>
-            </a:endParaRPr>
-          </a:p>
-        </p:txBody>
-      </p:sp>
-      <p:sp>
-        <p:nvSpPr>
-          <p:cNvPr id="1" name="PlaceHolder 2"/>
+            <a:endParaRPr lang="en-US" sz="4400" b="0" strike="noStrike" spc="-1">
+              <a:solidFill>
+                <a:srgbClr val="000000"/>
+              </a:solidFill>
+              <a:uFill>
+                <a:solidFill>
+                  <a:srgbClr val="FFFFFF"/>
+                </a:solidFill>
+              </a:uFill>
+              <a:latin typeface="Arial"/>
+            </a:endParaRPr>
+          </a:p>
+        </p:txBody>
+      </p:sp>
+      <p:sp>
+        <p:nvSpPr>
+          <p:cNvPr id="3" name="PlaceHolder 2"/>
           <p:cNvSpPr>
             <a:spLocks noGrp="1"/>
           </p:cNvSpPr>
@@ -619,16 +738,17 @@
           </a:prstGeom>
         </p:spPr>
         <p:txBody>
-          <a:bodyPr lIns="0" rIns="0" tIns="0" bIns="0" anchor="ctr"/>
+          <a:bodyPr lIns="0" tIns="0" rIns="0" bIns="0" anchor="ctr"/>
+          <a:lstStyle/>
           <a:p>
             <a:pPr algn="ctr"/>
-            <a:endParaRPr b="0" lang="en-US" sz="3200" spc="-1" strike="noStrike">
-              <a:solidFill>
-                <a:srgbClr val="000000"/>
-              </a:solidFill>
-              <a:uFill>
-                <a:solidFill>
-                  <a:srgbClr val="ffffff"/>
+            <a:endParaRPr lang="en-US" sz="3200" b="0" strike="noStrike" spc="-1">
+              <a:solidFill>
+                <a:srgbClr val="000000"/>
+              </a:solidFill>
+              <a:uFill>
+                <a:solidFill>
+                  <a:srgbClr val="FFFFFF"/>
                 </a:solidFill>
               </a:uFill>
               <a:latin typeface="Arial"/>
@@ -638,11 +758,14 @@
       </p:sp>
     </p:spTree>
   </p:cSld>
+  <p:clrMapOvr>
+    <a:masterClrMapping/>
+  </p:clrMapOvr>
 </p:sldLayout>
 </file>
 
 <file path=ppt/slideLayouts/slideLayout3.xml><?xml version="1.0" encoding="utf-8"?>
-<p:sldLayout xmlns:a="http://schemas.openxmlformats.org/drawingml/2006/main" xmlns:p="http://schemas.openxmlformats.org/presentationml/2006/main" xmlns:r="http://schemas.openxmlformats.org/officeDocument/2006/relationships" xmlns:p14="http://schemas.microsoft.com/office/powerpoint/2010/main" xmlns:p15="http://schemas.microsoft.com/office/powerpoint/2012/main" xmlns:mc="http://schemas.openxmlformats.org/markup-compatibility/2006" type="obj" preserve="1">
+<p:sldLayout xmlns:a="http://schemas.openxmlformats.org/drawingml/2006/main" xmlns:r="http://schemas.openxmlformats.org/officeDocument/2006/relationships" xmlns:p="http://schemas.openxmlformats.org/presentationml/2006/main" type="obj" preserve="1">
   <p:cSld name="Title, Content">
     <p:spTree>
       <p:nvGrpSpPr>
@@ -678,16 +801,17 @@
           </a:prstGeom>
         </p:spPr>
         <p:txBody>
-          <a:bodyPr lIns="0" rIns="0" tIns="0" bIns="0" anchor="ctr"/>
+          <a:bodyPr lIns="0" tIns="0" rIns="0" bIns="0" anchor="ctr"/>
+          <a:lstStyle/>
           <a:p>
             <a:pPr algn="ctr"/>
-            <a:endParaRPr b="0" lang="en-US" sz="4400" spc="-1" strike="noStrike">
-              <a:solidFill>
-                <a:srgbClr val="000000"/>
-              </a:solidFill>
-              <a:uFill>
-                <a:solidFill>
-                  <a:srgbClr val="ffffff"/>
+            <a:endParaRPr lang="en-US" sz="4400" b="0" strike="noStrike" spc="-1">
+              <a:solidFill>
+                <a:srgbClr val="000000"/>
+              </a:solidFill>
+              <a:uFill>
+                <a:solidFill>
+                  <a:srgbClr val="FFFFFF"/>
                 </a:solidFill>
               </a:uFill>
               <a:latin typeface="Arial"/>
@@ -715,15 +839,16 @@
           </a:prstGeom>
         </p:spPr>
         <p:txBody>
-          <a:bodyPr lIns="0" rIns="0" tIns="0" bIns="0"/>
-          <a:p>
-            <a:endParaRPr b="0" lang="en-US" sz="3200" spc="-1" strike="noStrike">
-              <a:solidFill>
-                <a:srgbClr val="000000"/>
-              </a:solidFill>
-              <a:uFill>
-                <a:solidFill>
-                  <a:srgbClr val="ffffff"/>
+          <a:bodyPr lIns="0" tIns="0" rIns="0" bIns="0"/>
+          <a:lstStyle/>
+          <a:p>
+            <a:endParaRPr lang="en-US" sz="3200" b="0" strike="noStrike" spc="-1">
+              <a:solidFill>
+                <a:srgbClr val="000000"/>
+              </a:solidFill>
+              <a:uFill>
+                <a:solidFill>
+                  <a:srgbClr val="FFFFFF"/>
                 </a:solidFill>
               </a:uFill>
               <a:latin typeface="Arial"/>
@@ -733,11 +858,14 @@
       </p:sp>
     </p:spTree>
   </p:cSld>
+  <p:clrMapOvr>
+    <a:masterClrMapping/>
+  </p:clrMapOvr>
 </p:sldLayout>
 </file>
 
 <file path=ppt/slideLayouts/slideLayout4.xml><?xml version="1.0" encoding="utf-8"?>
-<p:sldLayout xmlns:a="http://schemas.openxmlformats.org/drawingml/2006/main" xmlns:p="http://schemas.openxmlformats.org/presentationml/2006/main" xmlns:r="http://schemas.openxmlformats.org/officeDocument/2006/relationships" xmlns:p14="http://schemas.microsoft.com/office/powerpoint/2010/main" xmlns:p15="http://schemas.microsoft.com/office/powerpoint/2012/main" xmlns:mc="http://schemas.openxmlformats.org/markup-compatibility/2006" type="twoObj" preserve="1">
+<p:sldLayout xmlns:a="http://schemas.openxmlformats.org/drawingml/2006/main" xmlns:r="http://schemas.openxmlformats.org/officeDocument/2006/relationships" xmlns:p="http://schemas.openxmlformats.org/presentationml/2006/main" type="twoObj" preserve="1">
   <p:cSld name="Title, 2 Content">
     <p:spTree>
       <p:nvGrpSpPr>
@@ -773,16 +901,17 @@
           </a:prstGeom>
         </p:spPr>
         <p:txBody>
-          <a:bodyPr lIns="0" rIns="0" tIns="0" bIns="0" anchor="ctr"/>
+          <a:bodyPr lIns="0" tIns="0" rIns="0" bIns="0" anchor="ctr"/>
+          <a:lstStyle/>
           <a:p>
             <a:pPr algn="ctr"/>
-            <a:endParaRPr b="0" lang="en-US" sz="4400" spc="-1" strike="noStrike">
-              <a:solidFill>
-                <a:srgbClr val="000000"/>
-              </a:solidFill>
-              <a:uFill>
-                <a:solidFill>
-                  <a:srgbClr val="ffffff"/>
+            <a:endParaRPr lang="en-US" sz="4400" b="0" strike="noStrike" spc="-1">
+              <a:solidFill>
+                <a:srgbClr val="000000"/>
+              </a:solidFill>
+              <a:uFill>
+                <a:solidFill>
+                  <a:srgbClr val="FFFFFF"/>
                 </a:solidFill>
               </a:uFill>
               <a:latin typeface="Arial"/>
@@ -810,15 +939,16 @@
           </a:prstGeom>
         </p:spPr>
         <p:txBody>
-          <a:bodyPr lIns="0" rIns="0" tIns="0" bIns="0"/>
-          <a:p>
-            <a:endParaRPr b="0" lang="en-US" sz="3200" spc="-1" strike="noStrike">
-              <a:solidFill>
-                <a:srgbClr val="000000"/>
-              </a:solidFill>
-              <a:uFill>
-                <a:solidFill>
-                  <a:srgbClr val="ffffff"/>
+          <a:bodyPr lIns="0" tIns="0" rIns="0" bIns="0"/>
+          <a:lstStyle/>
+          <a:p>
+            <a:endParaRPr lang="en-US" sz="3200" b="0" strike="noStrike" spc="-1">
+              <a:solidFill>
+                <a:srgbClr val="000000"/>
+              </a:solidFill>
+              <a:uFill>
+                <a:solidFill>
+                  <a:srgbClr val="FFFFFF"/>
                 </a:solidFill>
               </a:uFill>
               <a:latin typeface="Arial"/>
@@ -846,15 +976,16 @@
           </a:prstGeom>
         </p:spPr>
         <p:txBody>
-          <a:bodyPr lIns="0" rIns="0" tIns="0" bIns="0"/>
-          <a:p>
-            <a:endParaRPr b="0" lang="en-US" sz="3200" spc="-1" strike="noStrike">
-              <a:solidFill>
-                <a:srgbClr val="000000"/>
-              </a:solidFill>
-              <a:uFill>
-                <a:solidFill>
-                  <a:srgbClr val="ffffff"/>
+          <a:bodyPr lIns="0" tIns="0" rIns="0" bIns="0"/>
+          <a:lstStyle/>
+          <a:p>
+            <a:endParaRPr lang="en-US" sz="3200" b="0" strike="noStrike" spc="-1">
+              <a:solidFill>
+                <a:srgbClr val="000000"/>
+              </a:solidFill>
+              <a:uFill>
+                <a:solidFill>
+                  <a:srgbClr val="FFFFFF"/>
                 </a:solidFill>
               </a:uFill>
               <a:latin typeface="Arial"/>
@@ -864,11 +995,14 @@
       </p:sp>
     </p:spTree>
   </p:cSld>
+  <p:clrMapOvr>
+    <a:masterClrMapping/>
+  </p:clrMapOvr>
 </p:sldLayout>
 </file>
 
 <file path=ppt/slideLayouts/slideLayout5.xml><?xml version="1.0" encoding="utf-8"?>
-<p:sldLayout xmlns:a="http://schemas.openxmlformats.org/drawingml/2006/main" xmlns:p="http://schemas.openxmlformats.org/presentationml/2006/main" xmlns:r="http://schemas.openxmlformats.org/officeDocument/2006/relationships" xmlns:p14="http://schemas.microsoft.com/office/powerpoint/2010/main" xmlns:p15="http://schemas.microsoft.com/office/powerpoint/2012/main" xmlns:mc="http://schemas.openxmlformats.org/markup-compatibility/2006" type="titleOnly" preserve="1">
+<p:sldLayout xmlns:a="http://schemas.openxmlformats.org/drawingml/2006/main" xmlns:r="http://schemas.openxmlformats.org/officeDocument/2006/relationships" xmlns:p="http://schemas.openxmlformats.org/presentationml/2006/main" type="titleOnly" preserve="1">
   <p:cSld name="Title Only">
     <p:spTree>
       <p:nvGrpSpPr>
@@ -904,16 +1038,17 @@
           </a:prstGeom>
         </p:spPr>
         <p:txBody>
-          <a:bodyPr lIns="0" rIns="0" tIns="0" bIns="0" anchor="ctr"/>
+          <a:bodyPr lIns="0" tIns="0" rIns="0" bIns="0" anchor="ctr"/>
+          <a:lstStyle/>
           <a:p>
             <a:pPr algn="ctr"/>
-            <a:endParaRPr b="0" lang="en-US" sz="4400" spc="-1" strike="noStrike">
-              <a:solidFill>
-                <a:srgbClr val="000000"/>
-              </a:solidFill>
-              <a:uFill>
-                <a:solidFill>
-                  <a:srgbClr val="ffffff"/>
+            <a:endParaRPr lang="en-US" sz="4400" b="0" strike="noStrike" spc="-1">
+              <a:solidFill>
+                <a:srgbClr val="000000"/>
+              </a:solidFill>
+              <a:uFill>
+                <a:solidFill>
+                  <a:srgbClr val="FFFFFF"/>
                 </a:solidFill>
               </a:uFill>
               <a:latin typeface="Arial"/>
@@ -923,11 +1058,14 @@
       </p:sp>
     </p:spTree>
   </p:cSld>
+  <p:clrMapOvr>
+    <a:masterClrMapping/>
+  </p:clrMapOvr>
 </p:sldLayout>
 </file>
 
 <file path=ppt/slideLayouts/slideLayout6.xml><?xml version="1.0" encoding="utf-8"?>
-<p:sldLayout xmlns:a="http://schemas.openxmlformats.org/drawingml/2006/main" xmlns:p="http://schemas.openxmlformats.org/presentationml/2006/main" xmlns:r="http://schemas.openxmlformats.org/officeDocument/2006/relationships" xmlns:p14="http://schemas.microsoft.com/office/powerpoint/2010/main" xmlns:p15="http://schemas.microsoft.com/office/powerpoint/2012/main" xmlns:mc="http://schemas.openxmlformats.org/markup-compatibility/2006" type="objOnly" preserve="1">
+<p:sldLayout xmlns:a="http://schemas.openxmlformats.org/drawingml/2006/main" xmlns:r="http://schemas.openxmlformats.org/officeDocument/2006/relationships" xmlns:p="http://schemas.openxmlformats.org/presentationml/2006/main" type="objOnly" preserve="1">
   <p:cSld name="Centered Text">
     <p:spTree>
       <p:nvGrpSpPr>
@@ -963,16 +1101,17 @@
           </a:prstGeom>
         </p:spPr>
         <p:txBody>
-          <a:bodyPr lIns="0" rIns="0" tIns="0" bIns="0" anchor="ctr"/>
+          <a:bodyPr lIns="0" tIns="0" rIns="0" bIns="0" anchor="ctr"/>
+          <a:lstStyle/>
           <a:p>
             <a:pPr algn="ctr"/>
-            <a:endParaRPr b="0" lang="en-US" sz="3200" spc="-1" strike="noStrike">
-              <a:solidFill>
-                <a:srgbClr val="000000"/>
-              </a:solidFill>
-              <a:uFill>
-                <a:solidFill>
-                  <a:srgbClr val="ffffff"/>
+            <a:endParaRPr lang="en-US" sz="3200" b="0" strike="noStrike" spc="-1">
+              <a:solidFill>
+                <a:srgbClr val="000000"/>
+              </a:solidFill>
+              <a:uFill>
+                <a:solidFill>
+                  <a:srgbClr val="FFFFFF"/>
                 </a:solidFill>
               </a:uFill>
               <a:latin typeface="Arial"/>
@@ -982,11 +1121,14 @@
       </p:sp>
     </p:spTree>
   </p:cSld>
+  <p:clrMapOvr>
+    <a:masterClrMapping/>
+  </p:clrMapOvr>
 </p:sldLayout>
 </file>
 
 <file path=ppt/slideLayouts/slideLayout7.xml><?xml version="1.0" encoding="utf-8"?>
-<p:sldLayout xmlns:a="http://schemas.openxmlformats.org/drawingml/2006/main" xmlns:p="http://schemas.openxmlformats.org/presentationml/2006/main" xmlns:r="http://schemas.openxmlformats.org/officeDocument/2006/relationships" xmlns:p14="http://schemas.microsoft.com/office/powerpoint/2010/main" xmlns:p15="http://schemas.microsoft.com/office/powerpoint/2012/main" xmlns:mc="http://schemas.openxmlformats.org/markup-compatibility/2006" type="twoObjAndObj" preserve="1">
+<p:sldLayout xmlns:a="http://schemas.openxmlformats.org/drawingml/2006/main" xmlns:r="http://schemas.openxmlformats.org/officeDocument/2006/relationships" xmlns:p="http://schemas.openxmlformats.org/presentationml/2006/main" type="twoObjAndObj" preserve="1">
   <p:cSld name="Title, 2 Content and Content">
     <p:spTree>
       <p:nvGrpSpPr>
@@ -1022,16 +1164,17 @@
           </a:prstGeom>
         </p:spPr>
         <p:txBody>
-          <a:bodyPr lIns="0" rIns="0" tIns="0" bIns="0" anchor="ctr"/>
+          <a:bodyPr lIns="0" tIns="0" rIns="0" bIns="0" anchor="ctr"/>
+          <a:lstStyle/>
           <a:p>
             <a:pPr algn="ctr"/>
-            <a:endParaRPr b="0" lang="en-US" sz="4400" spc="-1" strike="noStrike">
-              <a:solidFill>
-                <a:srgbClr val="000000"/>
-              </a:solidFill>
-              <a:uFill>
-                <a:solidFill>
-                  <a:srgbClr val="ffffff"/>
+            <a:endParaRPr lang="en-US" sz="4400" b="0" strike="noStrike" spc="-1">
+              <a:solidFill>
+                <a:srgbClr val="000000"/>
+              </a:solidFill>
+              <a:uFill>
+                <a:solidFill>
+                  <a:srgbClr val="FFFFFF"/>
                 </a:solidFill>
               </a:uFill>
               <a:latin typeface="Arial"/>
@@ -1059,15 +1202,16 @@
           </a:prstGeom>
         </p:spPr>
         <p:txBody>
-          <a:bodyPr lIns="0" rIns="0" tIns="0" bIns="0"/>
-          <a:p>
-            <a:endParaRPr b="0" lang="en-US" sz="3200" spc="-1" strike="noStrike">
-              <a:solidFill>
-                <a:srgbClr val="000000"/>
-              </a:solidFill>
-              <a:uFill>
-                <a:solidFill>
-                  <a:srgbClr val="ffffff"/>
+          <a:bodyPr lIns="0" tIns="0" rIns="0" bIns="0"/>
+          <a:lstStyle/>
+          <a:p>
+            <a:endParaRPr lang="en-US" sz="3200" b="0" strike="noStrike" spc="-1">
+              <a:solidFill>
+                <a:srgbClr val="000000"/>
+              </a:solidFill>
+              <a:uFill>
+                <a:solidFill>
+                  <a:srgbClr val="FFFFFF"/>
                 </a:solidFill>
               </a:uFill>
               <a:latin typeface="Arial"/>
@@ -1095,15 +1239,16 @@
           </a:prstGeom>
         </p:spPr>
         <p:txBody>
-          <a:bodyPr lIns="0" rIns="0" tIns="0" bIns="0"/>
-          <a:p>
-            <a:endParaRPr b="0" lang="en-US" sz="3200" spc="-1" strike="noStrike">
-              <a:solidFill>
-                <a:srgbClr val="000000"/>
-              </a:solidFill>
-              <a:uFill>
-                <a:solidFill>
-                  <a:srgbClr val="ffffff"/>
+          <a:bodyPr lIns="0" tIns="0" rIns="0" bIns="0"/>
+          <a:lstStyle/>
+          <a:p>
+            <a:endParaRPr lang="en-US" sz="3200" b="0" strike="noStrike" spc="-1">
+              <a:solidFill>
+                <a:srgbClr val="000000"/>
+              </a:solidFill>
+              <a:uFill>
+                <a:solidFill>
+                  <a:srgbClr val="FFFFFF"/>
                 </a:solidFill>
               </a:uFill>
               <a:latin typeface="Arial"/>
@@ -1131,15 +1276,16 @@
           </a:prstGeom>
         </p:spPr>
         <p:txBody>
-          <a:bodyPr lIns="0" rIns="0" tIns="0" bIns="0"/>
-          <a:p>
-            <a:endParaRPr b="0" lang="en-US" sz="3200" spc="-1" strike="noStrike">
-              <a:solidFill>
-                <a:srgbClr val="000000"/>
-              </a:solidFill>
-              <a:uFill>
-                <a:solidFill>
-                  <a:srgbClr val="ffffff"/>
+          <a:bodyPr lIns="0" tIns="0" rIns="0" bIns="0"/>
+          <a:lstStyle/>
+          <a:p>
+            <a:endParaRPr lang="en-US" sz="3200" b="0" strike="noStrike" spc="-1">
+              <a:solidFill>
+                <a:srgbClr val="000000"/>
+              </a:solidFill>
+              <a:uFill>
+                <a:solidFill>
+                  <a:srgbClr val="FFFFFF"/>
                 </a:solidFill>
               </a:uFill>
               <a:latin typeface="Arial"/>
@@ -1149,11 +1295,14 @@
       </p:sp>
     </p:spTree>
   </p:cSld>
+  <p:clrMapOvr>
+    <a:masterClrMapping/>
+  </p:clrMapOvr>
 </p:sldLayout>
 </file>
 
 <file path=ppt/slideLayouts/slideLayout8.xml><?xml version="1.0" encoding="utf-8"?>
-<p:sldLayout xmlns:a="http://schemas.openxmlformats.org/drawingml/2006/main" xmlns:p="http://schemas.openxmlformats.org/presentationml/2006/main" xmlns:r="http://schemas.openxmlformats.org/officeDocument/2006/relationships" xmlns:p14="http://schemas.microsoft.com/office/powerpoint/2010/main" xmlns:p15="http://schemas.microsoft.com/office/powerpoint/2012/main" xmlns:mc="http://schemas.openxmlformats.org/markup-compatibility/2006" type="objAndTwoObj" preserve="1">
+<p:sldLayout xmlns:a="http://schemas.openxmlformats.org/drawingml/2006/main" xmlns:r="http://schemas.openxmlformats.org/officeDocument/2006/relationships" xmlns:p="http://schemas.openxmlformats.org/presentationml/2006/main" type="objAndTwoObj" preserve="1">
   <p:cSld name="Title Content and 2 Content">
     <p:spTree>
       <p:nvGrpSpPr>
@@ -1189,16 +1338,17 @@
           </a:prstGeom>
         </p:spPr>
         <p:txBody>
-          <a:bodyPr lIns="0" rIns="0" tIns="0" bIns="0" anchor="ctr"/>
+          <a:bodyPr lIns="0" tIns="0" rIns="0" bIns="0" anchor="ctr"/>
+          <a:lstStyle/>
           <a:p>
             <a:pPr algn="ctr"/>
-            <a:endParaRPr b="0" lang="en-US" sz="4400" spc="-1" strike="noStrike">
-              <a:solidFill>
-                <a:srgbClr val="000000"/>
-              </a:solidFill>
-              <a:uFill>
-                <a:solidFill>
-                  <a:srgbClr val="ffffff"/>
+            <a:endParaRPr lang="en-US" sz="4400" b="0" strike="noStrike" spc="-1">
+              <a:solidFill>
+                <a:srgbClr val="000000"/>
+              </a:solidFill>
+              <a:uFill>
+                <a:solidFill>
+                  <a:srgbClr val="FFFFFF"/>
                 </a:solidFill>
               </a:uFill>
               <a:latin typeface="Arial"/>
@@ -1226,15 +1376,16 @@
           </a:prstGeom>
         </p:spPr>
         <p:txBody>
-          <a:bodyPr lIns="0" rIns="0" tIns="0" bIns="0"/>
-          <a:p>
-            <a:endParaRPr b="0" lang="en-US" sz="3200" spc="-1" strike="noStrike">
-              <a:solidFill>
-                <a:srgbClr val="000000"/>
-              </a:solidFill>
-              <a:uFill>
-                <a:solidFill>
-                  <a:srgbClr val="ffffff"/>
+          <a:bodyPr lIns="0" tIns="0" rIns="0" bIns="0"/>
+          <a:lstStyle/>
+          <a:p>
+            <a:endParaRPr lang="en-US" sz="3200" b="0" strike="noStrike" spc="-1">
+              <a:solidFill>
+                <a:srgbClr val="000000"/>
+              </a:solidFill>
+              <a:uFill>
+                <a:solidFill>
+                  <a:srgbClr val="FFFFFF"/>
                 </a:solidFill>
               </a:uFill>
               <a:latin typeface="Arial"/>
@@ -1262,15 +1413,16 @@
           </a:prstGeom>
         </p:spPr>
         <p:txBody>
-          <a:bodyPr lIns="0" rIns="0" tIns="0" bIns="0"/>
-          <a:p>
-            <a:endParaRPr b="0" lang="en-US" sz="3200" spc="-1" strike="noStrike">
-              <a:solidFill>
-                <a:srgbClr val="000000"/>
-              </a:solidFill>
-              <a:uFill>
-                <a:solidFill>
-                  <a:srgbClr val="ffffff"/>
+          <a:bodyPr lIns="0" tIns="0" rIns="0" bIns="0"/>
+          <a:lstStyle/>
+          <a:p>
+            <a:endParaRPr lang="en-US" sz="3200" b="0" strike="noStrike" spc="-1">
+              <a:solidFill>
+                <a:srgbClr val="000000"/>
+              </a:solidFill>
+              <a:uFill>
+                <a:solidFill>
+                  <a:srgbClr val="FFFFFF"/>
                 </a:solidFill>
               </a:uFill>
               <a:latin typeface="Arial"/>
@@ -1298,15 +1450,16 @@
           </a:prstGeom>
         </p:spPr>
         <p:txBody>
-          <a:bodyPr lIns="0" rIns="0" tIns="0" bIns="0"/>
-          <a:p>
-            <a:endParaRPr b="0" lang="en-US" sz="3200" spc="-1" strike="noStrike">
-              <a:solidFill>
-                <a:srgbClr val="000000"/>
-              </a:solidFill>
-              <a:uFill>
-                <a:solidFill>
-                  <a:srgbClr val="ffffff"/>
+          <a:bodyPr lIns="0" tIns="0" rIns="0" bIns="0"/>
+          <a:lstStyle/>
+          <a:p>
+            <a:endParaRPr lang="en-US" sz="3200" b="0" strike="noStrike" spc="-1">
+              <a:solidFill>
+                <a:srgbClr val="000000"/>
+              </a:solidFill>
+              <a:uFill>
+                <a:solidFill>
+                  <a:srgbClr val="FFFFFF"/>
                 </a:solidFill>
               </a:uFill>
               <a:latin typeface="Arial"/>
@@ -1316,11 +1469,14 @@
       </p:sp>
     </p:spTree>
   </p:cSld>
+  <p:clrMapOvr>
+    <a:masterClrMapping/>
+  </p:clrMapOvr>
 </p:sldLayout>
 </file>
 
 <file path=ppt/slideLayouts/slideLayout9.xml><?xml version="1.0" encoding="utf-8"?>
-<p:sldLayout xmlns:a="http://schemas.openxmlformats.org/drawingml/2006/main" xmlns:p="http://schemas.openxmlformats.org/presentationml/2006/main" xmlns:r="http://schemas.openxmlformats.org/officeDocument/2006/relationships" xmlns:p14="http://schemas.microsoft.com/office/powerpoint/2010/main" xmlns:p15="http://schemas.microsoft.com/office/powerpoint/2012/main" xmlns:mc="http://schemas.openxmlformats.org/markup-compatibility/2006" type="twoObjOverTx" preserve="1">
+<p:sldLayout xmlns:a="http://schemas.openxmlformats.org/drawingml/2006/main" xmlns:r="http://schemas.openxmlformats.org/officeDocument/2006/relationships" xmlns:p="http://schemas.openxmlformats.org/presentationml/2006/main" type="twoObjOverTx" preserve="1">
   <p:cSld name="Title, 2 Content over Content">
     <p:spTree>
       <p:nvGrpSpPr>
@@ -1356,16 +1512,17 @@
           </a:prstGeom>
         </p:spPr>
         <p:txBody>
-          <a:bodyPr lIns="0" rIns="0" tIns="0" bIns="0" anchor="ctr"/>
+          <a:bodyPr lIns="0" tIns="0" rIns="0" bIns="0" anchor="ctr"/>
+          <a:lstStyle/>
           <a:p>
             <a:pPr algn="ctr"/>
-            <a:endParaRPr b="0" lang="en-US" sz="4400" spc="-1" strike="noStrike">
-              <a:solidFill>
-                <a:srgbClr val="000000"/>
-              </a:solidFill>
-              <a:uFill>
-                <a:solidFill>
-                  <a:srgbClr val="ffffff"/>
+            <a:endParaRPr lang="en-US" sz="4400" b="0" strike="noStrike" spc="-1">
+              <a:solidFill>
+                <a:srgbClr val="000000"/>
+              </a:solidFill>
+              <a:uFill>
+                <a:solidFill>
+                  <a:srgbClr val="FFFFFF"/>
                 </a:solidFill>
               </a:uFill>
               <a:latin typeface="Arial"/>
@@ -1393,15 +1550,16 @@
           </a:prstGeom>
         </p:spPr>
         <p:txBody>
-          <a:bodyPr lIns="0" rIns="0" tIns="0" bIns="0"/>
-          <a:p>
-            <a:endParaRPr b="0" lang="en-US" sz="3200" spc="-1" strike="noStrike">
-              <a:solidFill>
-                <a:srgbClr val="000000"/>
-              </a:solidFill>
-              <a:uFill>
-                <a:solidFill>
-                  <a:srgbClr val="ffffff"/>
+          <a:bodyPr lIns="0" tIns="0" rIns="0" bIns="0"/>
+          <a:lstStyle/>
+          <a:p>
+            <a:endParaRPr lang="en-US" sz="3200" b="0" strike="noStrike" spc="-1">
+              <a:solidFill>
+                <a:srgbClr val="000000"/>
+              </a:solidFill>
+              <a:uFill>
+                <a:solidFill>
+                  <a:srgbClr val="FFFFFF"/>
                 </a:solidFill>
               </a:uFill>
               <a:latin typeface="Arial"/>
@@ -1429,15 +1587,16 @@
           </a:prstGeom>
         </p:spPr>
         <p:txBody>
-          <a:bodyPr lIns="0" rIns="0" tIns="0" bIns="0"/>
-          <a:p>
-            <a:endParaRPr b="0" lang="en-US" sz="3200" spc="-1" strike="noStrike">
-              <a:solidFill>
-                <a:srgbClr val="000000"/>
-              </a:solidFill>
-              <a:uFill>
-                <a:solidFill>
-                  <a:srgbClr val="ffffff"/>
+          <a:bodyPr lIns="0" tIns="0" rIns="0" bIns="0"/>
+          <a:lstStyle/>
+          <a:p>
+            <a:endParaRPr lang="en-US" sz="3200" b="0" strike="noStrike" spc="-1">
+              <a:solidFill>
+                <a:srgbClr val="000000"/>
+              </a:solidFill>
+              <a:uFill>
+                <a:solidFill>
+                  <a:srgbClr val="FFFFFF"/>
                 </a:solidFill>
               </a:uFill>
               <a:latin typeface="Arial"/>
@@ -1465,15 +1624,16 @@
           </a:prstGeom>
         </p:spPr>
         <p:txBody>
-          <a:bodyPr lIns="0" rIns="0" tIns="0" bIns="0"/>
-          <a:p>
-            <a:endParaRPr b="0" lang="en-US" sz="3200" spc="-1" strike="noStrike">
-              <a:solidFill>
-                <a:srgbClr val="000000"/>
-              </a:solidFill>
-              <a:uFill>
-                <a:solidFill>
-                  <a:srgbClr val="ffffff"/>
+          <a:bodyPr lIns="0" tIns="0" rIns="0" bIns="0"/>
+          <a:lstStyle/>
+          <a:p>
+            <a:endParaRPr lang="en-US" sz="3200" b="0" strike="noStrike" spc="-1">
+              <a:solidFill>
+                <a:srgbClr val="000000"/>
+              </a:solidFill>
+              <a:uFill>
+                <a:solidFill>
+                  <a:srgbClr val="FFFFFF"/>
                 </a:solidFill>
               </a:uFill>
               <a:latin typeface="Arial"/>
@@ -1483,12 +1643,20 @@
       </p:sp>
     </p:spTree>
   </p:cSld>
+  <p:clrMapOvr>
+    <a:masterClrMapping/>
+  </p:clrMapOvr>
 </p:sldLayout>
 </file>
 
 <file path=ppt/slideMasters/slideMaster1.xml><?xml version="1.0" encoding="utf-8"?>
-<p:sldMaster xmlns:a="http://schemas.openxmlformats.org/drawingml/2006/main" xmlns:p="http://schemas.openxmlformats.org/presentationml/2006/main" xmlns:r="http://schemas.openxmlformats.org/officeDocument/2006/relationships" xmlns:p14="http://schemas.microsoft.com/office/powerpoint/2010/main" xmlns:p15="http://schemas.microsoft.com/office/powerpoint/2012/main" xmlns:mc="http://schemas.openxmlformats.org/markup-compatibility/2006">
+<p:sldMaster xmlns:a="http://schemas.openxmlformats.org/drawingml/2006/main" xmlns:r="http://schemas.openxmlformats.org/officeDocument/2006/relationships" xmlns:p="http://schemas.openxmlformats.org/presentationml/2006/main">
   <p:cSld>
+    <p:bg>
+      <p:bgRef idx="1001">
+        <a:schemeClr val="bg1"/>
+      </p:bgRef>
+    </p:bg>
     <p:spTree>
       <p:nvGrpSpPr>
         <p:cNvPr id="1" name=""/>
@@ -1505,26 +1673,306 @@
       </p:grpSpPr>
     </p:spTree>
   </p:cSld>
-  <p:clrMap bg1="lt1" bg2="lt2" tx1="dk1" tx2="dk2" accent1="accent1" accent2="accent2" accent3="accent3" accent4="accent4" accent5="accent5" accent6="accent6" hlink="hlink" folHlink="folHlink"/>
+  <p:clrMap bg1="lt1" tx1="dk1" bg2="lt2" tx2="dk2" accent1="accent1" accent2="accent2" accent3="accent3" accent4="accent4" accent5="accent5" accent6="accent6" hlink="hlink" folHlink="folHlink"/>
   <p:sldLayoutIdLst>
-    <p:sldLayoutId id="2147483649" r:id="rId2"/>
-    <p:sldLayoutId id="2147483650" r:id="rId3"/>
-    <p:sldLayoutId id="2147483651" r:id="rId4"/>
-    <p:sldLayoutId id="2147483652" r:id="rId5"/>
-    <p:sldLayoutId id="2147483653" r:id="rId6"/>
-    <p:sldLayoutId id="2147483654" r:id="rId7"/>
-    <p:sldLayoutId id="2147483655" r:id="rId8"/>
-    <p:sldLayoutId id="2147483656" r:id="rId9"/>
-    <p:sldLayoutId id="2147483657" r:id="rId10"/>
-    <p:sldLayoutId id="2147483658" r:id="rId11"/>
-    <p:sldLayoutId id="2147483659" r:id="rId12"/>
-    <p:sldLayoutId id="2147483660" r:id="rId13"/>
+    <p:sldLayoutId id="2147483649" r:id="rId1"/>
+    <p:sldLayoutId id="2147483650" r:id="rId2"/>
+    <p:sldLayoutId id="2147483651" r:id="rId3"/>
+    <p:sldLayoutId id="2147483652" r:id="rId4"/>
+    <p:sldLayoutId id="2147483653" r:id="rId5"/>
+    <p:sldLayoutId id="2147483654" r:id="rId6"/>
+    <p:sldLayoutId id="2147483655" r:id="rId7"/>
+    <p:sldLayoutId id="2147483656" r:id="rId8"/>
+    <p:sldLayoutId id="2147483657" r:id="rId9"/>
+    <p:sldLayoutId id="2147483658" r:id="rId10"/>
+    <p:sldLayoutId id="2147483659" r:id="rId11"/>
+    <p:sldLayoutId id="2147483660" r:id="rId12"/>
   </p:sldLayoutIdLst>
+  <p:txStyles>
+    <p:titleStyle>
+      <a:lvl1pPr algn="l" defTabSz="914400" rtl="0" eaLnBrk="1" latinLnBrk="0" hangingPunct="1">
+        <a:lnSpc>
+          <a:spcPct val="90000"/>
+        </a:lnSpc>
+        <a:spcBef>
+          <a:spcPct val="0"/>
+        </a:spcBef>
+        <a:buNone/>
+        <a:defRPr sz="4400" kern="1200">
+          <a:solidFill>
+            <a:schemeClr val="tx1"/>
+          </a:solidFill>
+          <a:latin typeface="+mj-lt"/>
+          <a:ea typeface="+mj-ea"/>
+          <a:cs typeface="+mj-cs"/>
+        </a:defRPr>
+      </a:lvl1pPr>
+    </p:titleStyle>
+    <p:bodyStyle>
+      <a:lvl1pPr marL="228600" indent="-228600" algn="l" defTabSz="914400" rtl="0" eaLnBrk="1" latinLnBrk="0" hangingPunct="1">
+        <a:lnSpc>
+          <a:spcPct val="90000"/>
+        </a:lnSpc>
+        <a:spcBef>
+          <a:spcPts val="1000"/>
+        </a:spcBef>
+        <a:buFont typeface="Arial" panose="020B0604020202020204" pitchFamily="34" charset="0"/>
+        <a:buChar char="•"/>
+        <a:defRPr sz="2800" kern="1200">
+          <a:solidFill>
+            <a:schemeClr val="tx1"/>
+          </a:solidFill>
+          <a:latin typeface="+mn-lt"/>
+          <a:ea typeface="+mn-ea"/>
+          <a:cs typeface="+mn-cs"/>
+        </a:defRPr>
+      </a:lvl1pPr>
+      <a:lvl2pPr marL="685800" indent="-228600" algn="l" defTabSz="914400" rtl="0" eaLnBrk="1" latinLnBrk="0" hangingPunct="1">
+        <a:lnSpc>
+          <a:spcPct val="90000"/>
+        </a:lnSpc>
+        <a:spcBef>
+          <a:spcPts val="500"/>
+        </a:spcBef>
+        <a:buFont typeface="Arial" panose="020B0604020202020204" pitchFamily="34" charset="0"/>
+        <a:buChar char="•"/>
+        <a:defRPr sz="2400" kern="1200">
+          <a:solidFill>
+            <a:schemeClr val="tx1"/>
+          </a:solidFill>
+          <a:latin typeface="+mn-lt"/>
+          <a:ea typeface="+mn-ea"/>
+          <a:cs typeface="+mn-cs"/>
+        </a:defRPr>
+      </a:lvl2pPr>
+      <a:lvl3pPr marL="1143000" indent="-228600" algn="l" defTabSz="914400" rtl="0" eaLnBrk="1" latinLnBrk="0" hangingPunct="1">
+        <a:lnSpc>
+          <a:spcPct val="90000"/>
+        </a:lnSpc>
+        <a:spcBef>
+          <a:spcPts val="500"/>
+        </a:spcBef>
+        <a:buFont typeface="Arial" panose="020B0604020202020204" pitchFamily="34" charset="0"/>
+        <a:buChar char="•"/>
+        <a:defRPr sz="2000" kern="1200">
+          <a:solidFill>
+            <a:schemeClr val="tx1"/>
+          </a:solidFill>
+          <a:latin typeface="+mn-lt"/>
+          <a:ea typeface="+mn-ea"/>
+          <a:cs typeface="+mn-cs"/>
+        </a:defRPr>
+      </a:lvl3pPr>
+      <a:lvl4pPr marL="1600200" indent="-228600" algn="l" defTabSz="914400" rtl="0" eaLnBrk="1" latinLnBrk="0" hangingPunct="1">
+        <a:lnSpc>
+          <a:spcPct val="90000"/>
+        </a:lnSpc>
+        <a:spcBef>
+          <a:spcPts val="500"/>
+        </a:spcBef>
+        <a:buFont typeface="Arial" panose="020B0604020202020204" pitchFamily="34" charset="0"/>
+        <a:buChar char="•"/>
+        <a:defRPr sz="1800" kern="1200">
+          <a:solidFill>
+            <a:schemeClr val="tx1"/>
+          </a:solidFill>
+          <a:latin typeface="+mn-lt"/>
+          <a:ea typeface="+mn-ea"/>
+          <a:cs typeface="+mn-cs"/>
+        </a:defRPr>
+      </a:lvl4pPr>
+      <a:lvl5pPr marL="2057400" indent="-228600" algn="l" defTabSz="914400" rtl="0" eaLnBrk="1" latinLnBrk="0" hangingPunct="1">
+        <a:lnSpc>
+          <a:spcPct val="90000"/>
+        </a:lnSpc>
+        <a:spcBef>
+          <a:spcPts val="500"/>
+        </a:spcBef>
+        <a:buFont typeface="Arial" panose="020B0604020202020204" pitchFamily="34" charset="0"/>
+        <a:buChar char="•"/>
+        <a:defRPr sz="1800" kern="1200">
+          <a:solidFill>
+            <a:schemeClr val="tx1"/>
+          </a:solidFill>
+          <a:latin typeface="+mn-lt"/>
+          <a:ea typeface="+mn-ea"/>
+          <a:cs typeface="+mn-cs"/>
+        </a:defRPr>
+      </a:lvl5pPr>
+      <a:lvl6pPr marL="2514600" indent="-228600" algn="l" defTabSz="914400" rtl="0" eaLnBrk="1" latinLnBrk="0" hangingPunct="1">
+        <a:lnSpc>
+          <a:spcPct val="90000"/>
+        </a:lnSpc>
+        <a:spcBef>
+          <a:spcPts val="500"/>
+        </a:spcBef>
+        <a:buFont typeface="Arial" panose="020B0604020202020204" pitchFamily="34" charset="0"/>
+        <a:buChar char="•"/>
+        <a:defRPr sz="1800" kern="1200">
+          <a:solidFill>
+            <a:schemeClr val="tx1"/>
+          </a:solidFill>
+          <a:latin typeface="+mn-lt"/>
+          <a:ea typeface="+mn-ea"/>
+          <a:cs typeface="+mn-cs"/>
+        </a:defRPr>
+      </a:lvl6pPr>
+      <a:lvl7pPr marL="2971800" indent="-228600" algn="l" defTabSz="914400" rtl="0" eaLnBrk="1" latinLnBrk="0" hangingPunct="1">
+        <a:lnSpc>
+          <a:spcPct val="90000"/>
+        </a:lnSpc>
+        <a:spcBef>
+          <a:spcPts val="500"/>
+        </a:spcBef>
+        <a:buFont typeface="Arial" panose="020B0604020202020204" pitchFamily="34" charset="0"/>
+        <a:buChar char="•"/>
+        <a:defRPr sz="1800" kern="1200">
+          <a:solidFill>
+            <a:schemeClr val="tx1"/>
+          </a:solidFill>
+          <a:latin typeface="+mn-lt"/>
+          <a:ea typeface="+mn-ea"/>
+          <a:cs typeface="+mn-cs"/>
+        </a:defRPr>
+      </a:lvl7pPr>
+      <a:lvl8pPr marL="3429000" indent="-228600" algn="l" defTabSz="914400" rtl="0" eaLnBrk="1" latinLnBrk="0" hangingPunct="1">
+        <a:lnSpc>
+          <a:spcPct val="90000"/>
+        </a:lnSpc>
+        <a:spcBef>
+          <a:spcPts val="500"/>
+        </a:spcBef>
+        <a:buFont typeface="Arial" panose="020B0604020202020204" pitchFamily="34" charset="0"/>
+        <a:buChar char="•"/>
+        <a:defRPr sz="1800" kern="1200">
+          <a:solidFill>
+            <a:schemeClr val="tx1"/>
+          </a:solidFill>
+          <a:latin typeface="+mn-lt"/>
+          <a:ea typeface="+mn-ea"/>
+          <a:cs typeface="+mn-cs"/>
+        </a:defRPr>
+      </a:lvl8pPr>
+      <a:lvl9pPr marL="3886200" indent="-228600" algn="l" defTabSz="914400" rtl="0" eaLnBrk="1" latinLnBrk="0" hangingPunct="1">
+        <a:lnSpc>
+          <a:spcPct val="90000"/>
+        </a:lnSpc>
+        <a:spcBef>
+          <a:spcPts val="500"/>
+        </a:spcBef>
+        <a:buFont typeface="Arial" panose="020B0604020202020204" pitchFamily="34" charset="0"/>
+        <a:buChar char="•"/>
+        <a:defRPr sz="1800" kern="1200">
+          <a:solidFill>
+            <a:schemeClr val="tx1"/>
+          </a:solidFill>
+          <a:latin typeface="+mn-lt"/>
+          <a:ea typeface="+mn-ea"/>
+          <a:cs typeface="+mn-cs"/>
+        </a:defRPr>
+      </a:lvl9pPr>
+    </p:bodyStyle>
+    <p:otherStyle>
+      <a:defPPr>
+        <a:defRPr lang="en-US"/>
+      </a:defPPr>
+      <a:lvl1pPr marL="0" algn="l" defTabSz="914400" rtl="0" eaLnBrk="1" latinLnBrk="0" hangingPunct="1">
+        <a:defRPr sz="1800" kern="1200">
+          <a:solidFill>
+            <a:schemeClr val="tx1"/>
+          </a:solidFill>
+          <a:latin typeface="+mn-lt"/>
+          <a:ea typeface="+mn-ea"/>
+          <a:cs typeface="+mn-cs"/>
+        </a:defRPr>
+      </a:lvl1pPr>
+      <a:lvl2pPr marL="457200" algn="l" defTabSz="914400" rtl="0" eaLnBrk="1" latinLnBrk="0" hangingPunct="1">
+        <a:defRPr sz="1800" kern="1200">
+          <a:solidFill>
+            <a:schemeClr val="tx1"/>
+          </a:solidFill>
+          <a:latin typeface="+mn-lt"/>
+          <a:ea typeface="+mn-ea"/>
+          <a:cs typeface="+mn-cs"/>
+        </a:defRPr>
+      </a:lvl2pPr>
+      <a:lvl3pPr marL="914400" algn="l" defTabSz="914400" rtl="0" eaLnBrk="1" latinLnBrk="0" hangingPunct="1">
+        <a:defRPr sz="1800" kern="1200">
+          <a:solidFill>
+            <a:schemeClr val="tx1"/>
+          </a:solidFill>
+          <a:latin typeface="+mn-lt"/>
+          <a:ea typeface="+mn-ea"/>
+          <a:cs typeface="+mn-cs"/>
+        </a:defRPr>
+      </a:lvl3pPr>
+      <a:lvl4pPr marL="1371600" algn="l" defTabSz="914400" rtl="0" eaLnBrk="1" latinLnBrk="0" hangingPunct="1">
+        <a:defRPr sz="1800" kern="1200">
+          <a:solidFill>
+            <a:schemeClr val="tx1"/>
+          </a:solidFill>
+          <a:latin typeface="+mn-lt"/>
+          <a:ea typeface="+mn-ea"/>
+          <a:cs typeface="+mn-cs"/>
+        </a:defRPr>
+      </a:lvl4pPr>
+      <a:lvl5pPr marL="1828800" algn="l" defTabSz="914400" rtl="0" eaLnBrk="1" latinLnBrk="0" hangingPunct="1">
+        <a:defRPr sz="1800" kern="1200">
+          <a:solidFill>
+            <a:schemeClr val="tx1"/>
+          </a:solidFill>
+          <a:latin typeface="+mn-lt"/>
+          <a:ea typeface="+mn-ea"/>
+          <a:cs typeface="+mn-cs"/>
+        </a:defRPr>
+      </a:lvl5pPr>
+      <a:lvl6pPr marL="2286000" algn="l" defTabSz="914400" rtl="0" eaLnBrk="1" latinLnBrk="0" hangingPunct="1">
+        <a:defRPr sz="1800" kern="1200">
+          <a:solidFill>
+            <a:schemeClr val="tx1"/>
+          </a:solidFill>
+          <a:latin typeface="+mn-lt"/>
+          <a:ea typeface="+mn-ea"/>
+          <a:cs typeface="+mn-cs"/>
+        </a:defRPr>
+      </a:lvl6pPr>
+      <a:lvl7pPr marL="2743200" algn="l" defTabSz="914400" rtl="0" eaLnBrk="1" latinLnBrk="0" hangingPunct="1">
+        <a:defRPr sz="1800" kern="1200">
+          <a:solidFill>
+            <a:schemeClr val="tx1"/>
+          </a:solidFill>
+          <a:latin typeface="+mn-lt"/>
+          <a:ea typeface="+mn-ea"/>
+          <a:cs typeface="+mn-cs"/>
+        </a:defRPr>
+      </a:lvl7pPr>
+      <a:lvl8pPr marL="3200400" algn="l" defTabSz="914400" rtl="0" eaLnBrk="1" latinLnBrk="0" hangingPunct="1">
+        <a:defRPr sz="1800" kern="1200">
+          <a:solidFill>
+            <a:schemeClr val="tx1"/>
+          </a:solidFill>
+          <a:latin typeface="+mn-lt"/>
+          <a:ea typeface="+mn-ea"/>
+          <a:cs typeface="+mn-cs"/>
+        </a:defRPr>
+      </a:lvl8pPr>
+      <a:lvl9pPr marL="3657600" algn="l" defTabSz="914400" rtl="0" eaLnBrk="1" latinLnBrk="0" hangingPunct="1">
+        <a:defRPr sz="1800" kern="1200">
+          <a:solidFill>
+            <a:schemeClr val="tx1"/>
+          </a:solidFill>
+          <a:latin typeface="+mn-lt"/>
+          <a:ea typeface="+mn-ea"/>
+          <a:cs typeface="+mn-cs"/>
+        </a:defRPr>
+      </a:lvl9pPr>
+    </p:otherStyle>
+  </p:txStyles>
 </p:sldMaster>
 </file>
 
 <file path=ppt/slides/slide1.xml><?xml version="1.0" encoding="utf-8"?>
-<p:sld xmlns:a="http://schemas.openxmlformats.org/drawingml/2006/main" xmlns:p="http://schemas.openxmlformats.org/presentationml/2006/main" xmlns:r="http://schemas.openxmlformats.org/officeDocument/2006/relationships" xmlns:p14="http://schemas.microsoft.com/office/powerpoint/2010/main" xmlns:p15="http://schemas.microsoft.com/office/powerpoint/2012/main" xmlns:mc="http://schemas.openxmlformats.org/markup-compatibility/2006">
+<p:sld xmlns:a="http://schemas.openxmlformats.org/drawingml/2006/main" xmlns:r="http://schemas.openxmlformats.org/officeDocument/2006/relationships" xmlns:p="http://schemas.openxmlformats.org/presentationml/2006/main">
   <p:cSld>
     <p:spTree>
       <p:nvGrpSpPr>
@@ -1560,22 +2008,29 @@
           </a:ln>
         </p:spPr>
         <p:style>
-          <a:lnRef idx="0"/>
-          <a:fillRef idx="0"/>
-          <a:effectRef idx="0"/>
+          <a:lnRef idx="0">
+            <a:scrgbClr r="0" g="0" b="0"/>
+          </a:lnRef>
+          <a:fillRef idx="0">
+            <a:scrgbClr r="0" g="0" b="0"/>
+          </a:fillRef>
+          <a:effectRef idx="0">
+            <a:scrgbClr r="0" g="0" b="0"/>
+          </a:effectRef>
           <a:fontRef idx="minor"/>
         </p:style>
         <p:txBody>
-          <a:bodyPr lIns="90000" rIns="90000" tIns="45000" bIns="45000"/>
+          <a:bodyPr lIns="90000" tIns="45000" rIns="90000" bIns="45000"/>
+          <a:lstStyle/>
           <a:p>
             <a:r>
-              <a:rPr b="0" lang="en-US" sz="1400" spc="-1" strike="noStrike">
+              <a:rPr lang="en-US" sz="1400" b="0" strike="noStrike" spc="-1">
                 <a:solidFill>
                   <a:srgbClr val="000000"/>
                 </a:solidFill>
                 <a:uFill>
                   <a:solidFill>
-                    <a:srgbClr val="ffffff"/>
+                    <a:srgbClr val="FFFFFF"/>
                   </a:solidFill>
                 </a:uFill>
                 <a:latin typeface="Arial"/>
@@ -1583,13 +2038,13 @@
               </a:rPr>
               <a:t>PID Controller</a:t>
             </a:r>
-            <a:endParaRPr b="0" lang="en-US" sz="1800" spc="-1" strike="noStrike">
-              <a:solidFill>
-                <a:srgbClr val="000000"/>
-              </a:solidFill>
-              <a:uFill>
-                <a:solidFill>
-                  <a:srgbClr val="ffffff"/>
+            <a:endParaRPr lang="en-US" sz="1800" b="0" strike="noStrike" spc="-1">
+              <a:solidFill>
+                <a:srgbClr val="000000"/>
+              </a:solidFill>
+              <a:uFill>
+                <a:solidFill>
+                  <a:srgbClr val="FFFFFF"/>
                 </a:solidFill>
               </a:uFill>
               <a:latin typeface="Arial"/>
@@ -1606,7 +2061,7 @@
         <p:spPr>
           <a:xfrm>
             <a:off x="1280160" y="1513080"/>
-            <a:ext cx="1005840" cy="314640"/>
+            <a:ext cx="591170" cy="314640"/>
           </a:xfrm>
           <a:prstGeom prst="rect">
             <a:avLst/>
@@ -1617,36 +2072,43 @@
           </a:ln>
         </p:spPr>
         <p:style>
-          <a:lnRef idx="0"/>
-          <a:fillRef idx="0"/>
-          <a:effectRef idx="0"/>
+          <a:lnRef idx="0">
+            <a:scrgbClr r="0" g="0" b="0"/>
+          </a:lnRef>
+          <a:fillRef idx="0">
+            <a:scrgbClr r="0" g="0" b="0"/>
+          </a:fillRef>
+          <a:effectRef idx="0">
+            <a:scrgbClr r="0" g="0" b="0"/>
+          </a:effectRef>
           <a:fontRef idx="minor"/>
         </p:style>
         <p:txBody>
-          <a:bodyPr lIns="90000" rIns="90000" tIns="45000" bIns="45000"/>
+          <a:bodyPr lIns="90000" tIns="45000" rIns="90000" bIns="45000"/>
+          <a:lstStyle/>
           <a:p>
             <a:r>
-              <a:rPr b="0" lang="en-US" sz="1400" spc="-1" strike="noStrike">
+              <a:rPr lang="en-US" sz="1400" b="1" strike="noStrike" spc="-1" dirty="0" smtClean="0">
                 <a:solidFill>
                   <a:srgbClr val="000000"/>
                 </a:solidFill>
                 <a:uFill>
                   <a:solidFill>
-                    <a:srgbClr val="ffffff"/>
+                    <a:srgbClr val="FFFFFF"/>
                   </a:solidFill>
                 </a:uFill>
                 <a:latin typeface="Arial"/>
                 <a:ea typeface="DejaVu Sans"/>
               </a:rPr>
-              <a:t>Stabilizer</a:t>
+              <a:t>Rate</a:t>
             </a:r>
-            <a:endParaRPr b="0" lang="en-US" sz="1800" spc="-1" strike="noStrike">
-              <a:solidFill>
-                <a:srgbClr val="000000"/>
-              </a:solidFill>
-              <a:uFill>
-                <a:solidFill>
-                  <a:srgbClr val="ffffff"/>
+            <a:endParaRPr lang="en-US" sz="1800" b="1" strike="noStrike" spc="-1" dirty="0">
+              <a:solidFill>
+                <a:srgbClr val="000000"/>
+              </a:solidFill>
+              <a:uFill>
+                <a:solidFill>
+                  <a:srgbClr val="FFFFFF"/>
                 </a:solidFill>
               </a:uFill>
               <a:latin typeface="Arial"/>
@@ -1674,22 +2136,29 @@
           </a:ln>
         </p:spPr>
         <p:style>
-          <a:lnRef idx="0"/>
-          <a:fillRef idx="0"/>
-          <a:effectRef idx="0"/>
+          <a:lnRef idx="0">
+            <a:scrgbClr r="0" g="0" b="0"/>
+          </a:lnRef>
+          <a:fillRef idx="0">
+            <a:scrgbClr r="0" g="0" b="0"/>
+          </a:fillRef>
+          <a:effectRef idx="0">
+            <a:scrgbClr r="0" g="0" b="0"/>
+          </a:effectRef>
           <a:fontRef idx="minor"/>
         </p:style>
         <p:txBody>
-          <a:bodyPr lIns="90000" rIns="90000" tIns="45000" bIns="45000"/>
+          <a:bodyPr lIns="90000" tIns="45000" rIns="90000" bIns="45000"/>
+          <a:lstStyle/>
           <a:p>
             <a:r>
-              <a:rPr b="0" lang="en-US" sz="1400" spc="-1" strike="noStrike">
+              <a:rPr lang="en-US" sz="1400" b="0" strike="noStrike" spc="-1">
                 <a:solidFill>
                   <a:srgbClr val="000000"/>
                 </a:solidFill>
                 <a:uFill>
                   <a:solidFill>
-                    <a:srgbClr val="ffffff"/>
+                    <a:srgbClr val="FFFFFF"/>
                   </a:solidFill>
                 </a:uFill>
                 <a:latin typeface="Arial"/>
@@ -1697,13 +2166,13 @@
               </a:rPr>
               <a:t>Loiter</a:t>
             </a:r>
-            <a:endParaRPr b="0" lang="en-US" sz="1800" spc="-1" strike="noStrike">
-              <a:solidFill>
-                <a:srgbClr val="000000"/>
-              </a:solidFill>
-              <a:uFill>
-                <a:solidFill>
-                  <a:srgbClr val="ffffff"/>
+            <a:endParaRPr lang="en-US" sz="1800" b="0" strike="noStrike" spc="-1">
+              <a:solidFill>
+                <a:srgbClr val="000000"/>
+              </a:solidFill>
+              <a:uFill>
+                <a:solidFill>
+                  <a:srgbClr val="FFFFFF"/>
                 </a:solidFill>
               </a:uFill>
               <a:latin typeface="Arial"/>
@@ -1722,8 +2191,8 @@
         </p:nvCxnSpPr>
         <p:spPr>
           <a:xfrm flipH="1">
-            <a:off x="1783080" y="771840"/>
-            <a:ext cx="1285920" cy="741600"/>
+            <a:off x="1575745" y="771840"/>
+            <a:ext cx="1493075" cy="741240"/>
           </a:xfrm>
           <a:prstGeom prst="straightConnector1">
             <a:avLst/>
@@ -1759,8 +2228,99 @@
           </a:ln>
         </p:spPr>
       </p:cxnSp>
+      <p:sp>
+        <p:nvSpPr>
+          <p:cNvPr id="8" name="CustomShape 2"/>
+          <p:cNvSpPr/>
+          <p:nvPr/>
+        </p:nvSpPr>
+        <p:spPr>
+          <a:xfrm>
+            <a:off x="2719142" y="1508760"/>
+            <a:ext cx="711630" cy="314640"/>
+          </a:xfrm>
+          <a:prstGeom prst="rect">
+            <a:avLst/>
+          </a:prstGeom>
+          <a:noFill/>
+          <a:ln>
+            <a:noFill/>
+          </a:ln>
+        </p:spPr>
+        <p:style>
+          <a:lnRef idx="0">
+            <a:scrgbClr r="0" g="0" b="0"/>
+          </a:lnRef>
+          <a:fillRef idx="0">
+            <a:scrgbClr r="0" g="0" b="0"/>
+          </a:fillRef>
+          <a:effectRef idx="0">
+            <a:scrgbClr r="0" g="0" b="0"/>
+          </a:effectRef>
+          <a:fontRef idx="minor"/>
+        </p:style>
+        <p:txBody>
+          <a:bodyPr lIns="90000" tIns="45000" rIns="90000" bIns="45000"/>
+          <a:lstStyle/>
+          <a:p>
+            <a:r>
+              <a:rPr lang="en-US" sz="1400" b="0" strike="noStrike" spc="-1" dirty="0" smtClean="0">
+                <a:solidFill>
+                  <a:srgbClr val="000000"/>
+                </a:solidFill>
+                <a:uFill>
+                  <a:solidFill>
+                    <a:srgbClr val="FFFFFF"/>
+                  </a:solidFill>
+                </a:uFill>
+                <a:latin typeface="Arial"/>
+                <a:ea typeface="DejaVu Sans"/>
+              </a:rPr>
+              <a:t>Level</a:t>
+            </a:r>
+            <a:endParaRPr lang="en-US" sz="1800" b="0" strike="noStrike" spc="-1" dirty="0">
+              <a:solidFill>
+                <a:srgbClr val="000000"/>
+              </a:solidFill>
+              <a:uFill>
+                <a:solidFill>
+                  <a:srgbClr val="FFFFFF"/>
+                </a:solidFill>
+              </a:uFill>
+              <a:latin typeface="Arial"/>
+            </a:endParaRPr>
+          </a:p>
+        </p:txBody>
+      </p:sp>
+      <p:cxnSp>
+        <p:nvCxnSpPr>
+          <p:cNvPr id="9" name="Line 4"/>
+          <p:cNvCxnSpPr>
+            <a:stCxn id="34" idx="2"/>
+            <a:endCxn id="8" idx="0"/>
+          </p:cNvCxnSpPr>
+          <p:nvPr/>
+        </p:nvCxnSpPr>
+        <p:spPr>
+          <a:xfrm>
+            <a:off x="3068820" y="771840"/>
+            <a:ext cx="6137" cy="736920"/>
+          </a:xfrm>
+          <a:prstGeom prst="straightConnector1">
+            <a:avLst/>
+          </a:prstGeom>
+          <a:ln>
+            <a:solidFill>
+              <a:srgbClr val="000000"/>
+            </a:solidFill>
+          </a:ln>
+        </p:spPr>
+      </p:cxnSp>
     </p:spTree>
   </p:cSld>
+  <p:clrMapOvr>
+    <a:masterClrMapping/>
+  </p:clrMapOvr>
   <p:timing>
     <p:tnLst>
       <p:par>
@@ -1769,14 +2329,14 @@
             <p:seq>
               <p:cTn id="2" nodeType="mainSeq"/>
               <p:prevCondLst>
-                <p:cond delay="0" evt="onPrev">
+                <p:cond evt="onPrev" delay="0">
                   <p:tgtEl>
                     <p:sldTgt/>
                   </p:tgtEl>
                 </p:cond>
               </p:prevCondLst>
               <p:nextCondLst>
-                <p:cond delay="0" evt="onNext">
+                <p:cond evt="onNext" delay="0">
                   <p:tgtEl>
                     <p:sldTgt/>
                   </p:tgtEl>
@@ -2011,5 +2571,7 @@
       </a:bgFillStyleLst>
     </a:fmtScheme>
   </a:themeElements>
+  <a:objectDefaults/>
+  <a:extraClrSchemeLst/>
 </a:theme>
 </file>
</xml_diff>

<commit_message>
Fixed references to new AltitudeHold controller
</commit_message>
<xml_diff>
--- a/extras/media/pidcontrollers.pptx
+++ b/extras/media/pidcontrollers.pptx
@@ -104,6 +104,11 @@
       </a:defRPr>
     </a:lvl9pPr>
   </p:defaultTextStyle>
+  <p:extLst>
+    <p:ext uri="{EFAFB233-063F-42B5-8137-9DF3F51BA10A}">
+      <p15:sldGuideLst xmlns:p15="http://schemas.microsoft.com/office/powerpoint/2012/main"/>
+    </p:ext>
+  </p:extLst>
 </p:presentation>
 </file>
 
@@ -2124,8 +2129,8 @@
         </p:nvSpPr>
         <p:spPr>
           <a:xfrm>
-            <a:off x="4114800" y="1508760"/>
-            <a:ext cx="651240" cy="314640"/>
+            <a:off x="4114799" y="1508760"/>
+            <a:ext cx="1158949" cy="314640"/>
           </a:xfrm>
           <a:prstGeom prst="rect">
             <a:avLst/>
@@ -2152,7 +2157,7 @@
           <a:lstStyle/>
           <a:p>
             <a:r>
-              <a:rPr lang="en-US" sz="1400" b="0" strike="noStrike" spc="-1">
+              <a:rPr lang="en-US" sz="1400" b="0" strike="noStrike" spc="-1" dirty="0" err="1" smtClean="0">
                 <a:solidFill>
                   <a:srgbClr val="000000"/>
                 </a:solidFill>
@@ -2164,9 +2169,9 @@
                 <a:latin typeface="Arial"/>
                 <a:ea typeface="DejaVu Sans"/>
               </a:rPr>
-              <a:t>Loiter</a:t>
+              <a:t>AltitudeHold</a:t>
             </a:r>
-            <a:endParaRPr lang="en-US" sz="1800" b="0" strike="noStrike" spc="-1">
+            <a:endParaRPr lang="en-US" sz="1800" b="0" strike="noStrike" spc="-1" dirty="0">
               <a:solidFill>
                 <a:srgbClr val="000000"/>
               </a:solidFill>
@@ -2215,8 +2220,8 @@
         </p:nvCxnSpPr>
         <p:spPr>
           <a:xfrm>
-            <a:off x="3068640" y="771840"/>
-            <a:ext cx="1371960" cy="737280"/>
+            <a:off x="3068820" y="771840"/>
+            <a:ext cx="1625454" cy="736920"/>
           </a:xfrm>
           <a:prstGeom prst="straightConnector1">
             <a:avLst/>

</xml_diff>

<commit_message>
Updated PID controller info
</commit_message>
<xml_diff>
--- a/extras/media/pidcontrollers.pptx
+++ b/extras/media/pidcontrollers.pptx
@@ -2093,7 +2093,7 @@
           <a:lstStyle/>
           <a:p>
             <a:r>
-              <a:rPr lang="en-US" sz="1400" b="1" strike="noStrike" spc="-1" dirty="0" smtClean="0">
+              <a:rPr lang="en-US" sz="1400" strike="noStrike" spc="-1" dirty="0" err="1" smtClean="0">
                 <a:solidFill>
                   <a:srgbClr val="000000"/>
                 </a:solidFill>
@@ -2105,9 +2105,9 @@
                 <a:latin typeface="Arial"/>
                 <a:ea typeface="DejaVu Sans"/>
               </a:rPr>
-              <a:t>Rate</a:t>
+              <a:t>Acro</a:t>
             </a:r>
-            <a:endParaRPr lang="en-US" sz="1800" b="1" strike="noStrike" spc="-1" dirty="0">
+            <a:endParaRPr lang="en-US" sz="1800" strike="noStrike" spc="-1" dirty="0">
               <a:solidFill>
                 <a:srgbClr val="000000"/>
               </a:solidFill>
@@ -2241,7 +2241,7 @@
         </p:nvSpPr>
         <p:spPr>
           <a:xfrm>
-            <a:off x="2719142" y="1508760"/>
+            <a:off x="2167048" y="1508760"/>
             <a:ext cx="711630" cy="314640"/>
           </a:xfrm>
           <a:prstGeom prst="rect">
@@ -2307,9 +2307,9 @@
           <p:nvPr/>
         </p:nvCxnSpPr>
         <p:spPr>
-          <a:xfrm>
-            <a:off x="3068820" y="771840"/>
-            <a:ext cx="6137" cy="736920"/>
+          <a:xfrm flipH="1">
+            <a:off x="2522863" y="771840"/>
+            <a:ext cx="545957" cy="736920"/>
           </a:xfrm>
           <a:prstGeom prst="straightConnector1">
             <a:avLst/>
@@ -2321,6 +2321,344 @@
           </a:ln>
         </p:spPr>
       </p:cxnSp>
+      <p:sp>
+        <p:nvSpPr>
+          <p:cNvPr id="10" name="CustomShape 2"/>
+          <p:cNvSpPr/>
+          <p:nvPr/>
+        </p:nvSpPr>
+        <p:spPr>
+          <a:xfrm>
+            <a:off x="3130334" y="1505890"/>
+            <a:ext cx="587955" cy="314640"/>
+          </a:xfrm>
+          <a:prstGeom prst="rect">
+            <a:avLst/>
+          </a:prstGeom>
+          <a:noFill/>
+          <a:ln>
+            <a:noFill/>
+          </a:ln>
+        </p:spPr>
+        <p:style>
+          <a:lnRef idx="0">
+            <a:scrgbClr r="0" g="0" b="0"/>
+          </a:lnRef>
+          <a:fillRef idx="0">
+            <a:scrgbClr r="0" g="0" b="0"/>
+          </a:fillRef>
+          <a:effectRef idx="0">
+            <a:scrgbClr r="0" g="0" b="0"/>
+          </a:effectRef>
+          <a:fontRef idx="minor"/>
+        </p:style>
+        <p:txBody>
+          <a:bodyPr lIns="90000" tIns="45000" rIns="90000" bIns="45000"/>
+          <a:lstStyle/>
+          <a:p>
+            <a:r>
+              <a:rPr lang="en-US" sz="1400" b="0" strike="noStrike" spc="-1" dirty="0" smtClean="0">
+                <a:solidFill>
+                  <a:srgbClr val="000000"/>
+                </a:solidFill>
+                <a:uFill>
+                  <a:solidFill>
+                    <a:srgbClr val="FFFFFF"/>
+                  </a:solidFill>
+                </a:uFill>
+                <a:latin typeface="Arial"/>
+                <a:ea typeface="DejaVu Sans"/>
+              </a:rPr>
+              <a:t>Yaw</a:t>
+            </a:r>
+            <a:endParaRPr lang="en-US" sz="1800" b="0" strike="noStrike" spc="-1" dirty="0">
+              <a:solidFill>
+                <a:srgbClr val="000000"/>
+              </a:solidFill>
+              <a:uFill>
+                <a:solidFill>
+                  <a:srgbClr val="FFFFFF"/>
+                </a:solidFill>
+              </a:uFill>
+              <a:latin typeface="Arial"/>
+            </a:endParaRPr>
+          </a:p>
+        </p:txBody>
+      </p:sp>
+      <p:cxnSp>
+        <p:nvCxnSpPr>
+          <p:cNvPr id="11" name="Line 4"/>
+          <p:cNvCxnSpPr>
+            <a:stCxn id="34" idx="2"/>
+            <a:endCxn id="10" idx="0"/>
+          </p:cNvCxnSpPr>
+          <p:nvPr/>
+        </p:nvCxnSpPr>
+        <p:spPr>
+          <a:xfrm>
+            <a:off x="3068820" y="771840"/>
+            <a:ext cx="355492" cy="734050"/>
+          </a:xfrm>
+          <a:prstGeom prst="straightConnector1">
+            <a:avLst/>
+          </a:prstGeom>
+          <a:ln>
+            <a:solidFill>
+              <a:srgbClr val="000000"/>
+            </a:solidFill>
+          </a:ln>
+        </p:spPr>
+      </p:cxnSp>
+      <p:sp>
+        <p:nvSpPr>
+          <p:cNvPr id="14" name="CustomShape 2"/>
+          <p:cNvSpPr/>
+          <p:nvPr/>
+        </p:nvSpPr>
+        <p:spPr>
+          <a:xfrm>
+            <a:off x="1380803" y="1777622"/>
+            <a:ext cx="1030073" cy="314640"/>
+          </a:xfrm>
+          <a:prstGeom prst="rect">
+            <a:avLst/>
+          </a:prstGeom>
+          <a:noFill/>
+          <a:ln>
+            <a:noFill/>
+          </a:ln>
+        </p:spPr>
+        <p:style>
+          <a:lnRef idx="0">
+            <a:scrgbClr r="0" g="0" b="0"/>
+          </a:lnRef>
+          <a:fillRef idx="0">
+            <a:scrgbClr r="0" g="0" b="0"/>
+          </a:fillRef>
+          <a:effectRef idx="0">
+            <a:scrgbClr r="0" g="0" b="0"/>
+          </a:effectRef>
+          <a:fontRef idx="minor"/>
+        </p:style>
+        <p:txBody>
+          <a:bodyPr lIns="90000" tIns="45000" rIns="90000" bIns="45000"/>
+          <a:lstStyle/>
+          <a:p>
+            <a:r>
+              <a:rPr lang="en-US" sz="1200" strike="noStrike" spc="-1" dirty="0" err="1" smtClean="0">
+                <a:solidFill>
+                  <a:srgbClr val="000000"/>
+                </a:solidFill>
+                <a:uFill>
+                  <a:solidFill>
+                    <a:srgbClr val="FFFFFF"/>
+                  </a:solidFill>
+                </a:uFill>
+                <a:latin typeface="Arial"/>
+                <a:ea typeface="DejaVu Sans"/>
+              </a:rPr>
+              <a:t>RollRate</a:t>
+            </a:r>
+            <a:endParaRPr lang="en-US" sz="1200" strike="noStrike" spc="-1" dirty="0" smtClean="0">
+              <a:solidFill>
+                <a:srgbClr val="000000"/>
+              </a:solidFill>
+              <a:uFill>
+                <a:solidFill>
+                  <a:srgbClr val="FFFFFF"/>
+                </a:solidFill>
+              </a:uFill>
+              <a:latin typeface="Arial"/>
+              <a:ea typeface="DejaVu Sans"/>
+            </a:endParaRPr>
+          </a:p>
+          <a:p>
+            <a:r>
+              <a:rPr lang="en-US" sz="1200" spc="-1" dirty="0" err="1" smtClean="0">
+                <a:solidFill>
+                  <a:srgbClr val="000000"/>
+                </a:solidFill>
+                <a:uFill>
+                  <a:solidFill>
+                    <a:srgbClr val="FFFFFF"/>
+                  </a:solidFill>
+                </a:uFill>
+                <a:latin typeface="Arial"/>
+                <a:ea typeface="DejaVu Sans"/>
+              </a:rPr>
+              <a:t>PitchRate</a:t>
+            </a:r>
+            <a:endParaRPr lang="en-US" sz="1200" strike="noStrike" spc="-1" dirty="0">
+              <a:solidFill>
+                <a:srgbClr val="000000"/>
+              </a:solidFill>
+              <a:uFill>
+                <a:solidFill>
+                  <a:srgbClr val="FFFFFF"/>
+                </a:solidFill>
+              </a:uFill>
+              <a:latin typeface="Arial"/>
+            </a:endParaRPr>
+          </a:p>
+        </p:txBody>
+      </p:sp>
+      <p:sp>
+        <p:nvSpPr>
+          <p:cNvPr id="15" name="CustomShape 2"/>
+          <p:cNvSpPr/>
+          <p:nvPr/>
+        </p:nvSpPr>
+        <p:spPr>
+          <a:xfrm>
+            <a:off x="2275072" y="1766122"/>
+            <a:ext cx="1030073" cy="314640"/>
+          </a:xfrm>
+          <a:prstGeom prst="rect">
+            <a:avLst/>
+          </a:prstGeom>
+          <a:noFill/>
+          <a:ln>
+            <a:noFill/>
+          </a:ln>
+        </p:spPr>
+        <p:style>
+          <a:lnRef idx="0">
+            <a:scrgbClr r="0" g="0" b="0"/>
+          </a:lnRef>
+          <a:fillRef idx="0">
+            <a:scrgbClr r="0" g="0" b="0"/>
+          </a:fillRef>
+          <a:effectRef idx="0">
+            <a:scrgbClr r="0" g="0" b="0"/>
+          </a:effectRef>
+          <a:fontRef idx="minor"/>
+        </p:style>
+        <p:txBody>
+          <a:bodyPr lIns="90000" tIns="45000" rIns="90000" bIns="45000"/>
+          <a:lstStyle/>
+          <a:p>
+            <a:r>
+              <a:rPr lang="en-US" sz="1200" strike="noStrike" spc="-1" dirty="0" err="1" smtClean="0">
+                <a:solidFill>
+                  <a:srgbClr val="000000"/>
+                </a:solidFill>
+                <a:uFill>
+                  <a:solidFill>
+                    <a:srgbClr val="FFFFFF"/>
+                  </a:solidFill>
+                </a:uFill>
+                <a:latin typeface="Arial"/>
+                <a:ea typeface="DejaVu Sans"/>
+              </a:rPr>
+              <a:t>RollAngle</a:t>
+            </a:r>
+            <a:endParaRPr lang="en-US" sz="1200" strike="noStrike" spc="-1" dirty="0" smtClean="0">
+              <a:solidFill>
+                <a:srgbClr val="000000"/>
+              </a:solidFill>
+              <a:uFill>
+                <a:solidFill>
+                  <a:srgbClr val="FFFFFF"/>
+                </a:solidFill>
+              </a:uFill>
+              <a:latin typeface="Arial"/>
+              <a:ea typeface="DejaVu Sans"/>
+            </a:endParaRPr>
+          </a:p>
+          <a:p>
+            <a:r>
+              <a:rPr lang="en-US" sz="1200" spc="-1" dirty="0" err="1" smtClean="0">
+                <a:solidFill>
+                  <a:srgbClr val="000000"/>
+                </a:solidFill>
+                <a:uFill>
+                  <a:solidFill>
+                    <a:srgbClr val="FFFFFF"/>
+                  </a:solidFill>
+                </a:uFill>
+                <a:latin typeface="Arial"/>
+                <a:ea typeface="DejaVu Sans"/>
+              </a:rPr>
+              <a:t>PitchAngle</a:t>
+            </a:r>
+            <a:endParaRPr lang="en-US" sz="1200" strike="noStrike" spc="-1" dirty="0">
+              <a:solidFill>
+                <a:srgbClr val="000000"/>
+              </a:solidFill>
+              <a:uFill>
+                <a:solidFill>
+                  <a:srgbClr val="FFFFFF"/>
+                </a:solidFill>
+              </a:uFill>
+              <a:latin typeface="Arial"/>
+            </a:endParaRPr>
+          </a:p>
+        </p:txBody>
+      </p:sp>
+      <p:sp>
+        <p:nvSpPr>
+          <p:cNvPr id="16" name="CustomShape 2"/>
+          <p:cNvSpPr/>
+          <p:nvPr/>
+        </p:nvSpPr>
+        <p:spPr>
+          <a:xfrm>
+            <a:off x="3232609" y="1757502"/>
+            <a:ext cx="1030073" cy="314640"/>
+          </a:xfrm>
+          <a:prstGeom prst="rect">
+            <a:avLst/>
+          </a:prstGeom>
+          <a:noFill/>
+          <a:ln>
+            <a:noFill/>
+          </a:ln>
+        </p:spPr>
+        <p:style>
+          <a:lnRef idx="0">
+            <a:scrgbClr r="0" g="0" b="0"/>
+          </a:lnRef>
+          <a:fillRef idx="0">
+            <a:scrgbClr r="0" g="0" b="0"/>
+          </a:fillRef>
+          <a:effectRef idx="0">
+            <a:scrgbClr r="0" g="0" b="0"/>
+          </a:effectRef>
+          <a:fontRef idx="minor"/>
+        </p:style>
+        <p:txBody>
+          <a:bodyPr lIns="90000" tIns="45000" rIns="90000" bIns="45000"/>
+          <a:lstStyle/>
+          <a:p>
+            <a:r>
+              <a:rPr lang="en-US" sz="1200" strike="noStrike" spc="-1" dirty="0" err="1" smtClean="0">
+                <a:solidFill>
+                  <a:srgbClr val="000000"/>
+                </a:solidFill>
+                <a:uFill>
+                  <a:solidFill>
+                    <a:srgbClr val="FFFFFF"/>
+                  </a:solidFill>
+                </a:uFill>
+                <a:latin typeface="Arial"/>
+                <a:ea typeface="DejaVu Sans"/>
+              </a:rPr>
+              <a:t>YawRate</a:t>
+            </a:r>
+            <a:endParaRPr lang="en-US" sz="1200" strike="noStrike" spc="-1" dirty="0">
+              <a:solidFill>
+                <a:srgbClr val="000000"/>
+              </a:solidFill>
+              <a:uFill>
+                <a:solidFill>
+                  <a:srgbClr val="FFFFFF"/>
+                </a:solidFill>
+              </a:uFill>
+              <a:latin typeface="Arial"/>
+            </a:endParaRPr>
+          </a:p>
+        </p:txBody>
+      </p:sp>
     </p:spTree>
   </p:cSld>
   <p:clrMapOvr>

</xml_diff>

<commit_message>
More PID controller work
</commit_message>
<xml_diff>
--- a/extras/media/pidcontrollers.pptx
+++ b/extras/media/pidcontrollers.pptx
@@ -2130,7 +2130,7 @@
         <p:spPr>
           <a:xfrm>
             <a:off x="4114799" y="1508760"/>
-            <a:ext cx="1158949" cy="314640"/>
+            <a:ext cx="802911" cy="314640"/>
           </a:xfrm>
           <a:prstGeom prst="rect">
             <a:avLst/>
@@ -2157,7 +2157,7 @@
           <a:lstStyle/>
           <a:p>
             <a:r>
-              <a:rPr lang="en-US" sz="1400" b="0" strike="noStrike" spc="-1" dirty="0" err="1" smtClean="0">
+              <a:rPr lang="en-US" sz="1400" b="0" strike="noStrike" spc="-1" dirty="0" smtClean="0">
                 <a:solidFill>
                   <a:srgbClr val="000000"/>
                 </a:solidFill>
@@ -2169,7 +2169,7 @@
                 <a:latin typeface="Arial"/>
                 <a:ea typeface="DejaVu Sans"/>
               </a:rPr>
-              <a:t>AltitudeHold</a:t>
+              <a:t>Altitude</a:t>
             </a:r>
             <a:endParaRPr lang="en-US" sz="1800" b="0" strike="noStrike" spc="-1" dirty="0">
               <a:solidFill>
@@ -2221,7 +2221,7 @@
         <p:spPr>
           <a:xfrm>
             <a:off x="3068820" y="771840"/>
-            <a:ext cx="1625454" cy="736920"/>
+            <a:ext cx="1447435" cy="736920"/>
           </a:xfrm>
           <a:prstGeom prst="straightConnector1">
             <a:avLst/>
@@ -2241,7 +2241,7 @@
         </p:nvSpPr>
         <p:spPr>
           <a:xfrm>
-            <a:off x="2167048" y="1508760"/>
+            <a:off x="2713005" y="1508760"/>
             <a:ext cx="711630" cy="314640"/>
           </a:xfrm>
           <a:prstGeom prst="rect">
@@ -2307,9 +2307,9 @@
           <p:nvPr/>
         </p:nvCxnSpPr>
         <p:spPr>
-          <a:xfrm flipH="1">
-            <a:off x="2522863" y="771840"/>
-            <a:ext cx="545957" cy="736920"/>
+          <a:xfrm>
+            <a:off x="3068820" y="771840"/>
+            <a:ext cx="0" cy="736920"/>
           </a:xfrm>
           <a:prstGeom prst="straightConnector1">
             <a:avLst/>
@@ -2323,14 +2323,14 @@
       </p:cxnSp>
       <p:sp>
         <p:nvSpPr>
-          <p:cNvPr id="10" name="CustomShape 2"/>
+          <p:cNvPr id="14" name="CustomShape 2"/>
           <p:cNvSpPr/>
           <p:nvPr/>
         </p:nvSpPr>
         <p:spPr>
           <a:xfrm>
-            <a:off x="3130334" y="1505890"/>
-            <a:ext cx="587955" cy="314640"/>
+            <a:off x="1380803" y="1777622"/>
+            <a:ext cx="1030073" cy="314640"/>
           </a:xfrm>
           <a:prstGeom prst="rect">
             <a:avLst/>
@@ -2357,7 +2357,7 @@
           <a:lstStyle/>
           <a:p>
             <a:r>
-              <a:rPr lang="en-US" sz="1400" b="0" strike="noStrike" spc="-1" dirty="0" smtClean="0">
+              <a:rPr lang="en-US" sz="1200" strike="noStrike" spc="-1" dirty="0" err="1" smtClean="0">
                 <a:solidFill>
                   <a:srgbClr val="000000"/>
                 </a:solidFill>
@@ -2369,55 +2369,89 @@
                 <a:latin typeface="Arial"/>
                 <a:ea typeface="DejaVu Sans"/>
               </a:rPr>
-              <a:t>Yaw</a:t>
+              <a:t>RollRate</a:t>
             </a:r>
-            <a:endParaRPr lang="en-US" sz="1800" b="0" strike="noStrike" spc="-1" dirty="0">
-              <a:solidFill>
-                <a:srgbClr val="000000"/>
-              </a:solidFill>
-              <a:uFill>
-                <a:solidFill>
-                  <a:srgbClr val="FFFFFF"/>
-                </a:solidFill>
-              </a:uFill>
-              <a:latin typeface="Arial"/>
-            </a:endParaRPr>
-          </a:p>
-        </p:txBody>
-      </p:sp>
-      <p:cxnSp>
-        <p:nvCxnSpPr>
-          <p:cNvPr id="11" name="Line 4"/>
-          <p:cNvCxnSpPr>
-            <a:stCxn id="34" idx="2"/>
-            <a:endCxn id="10" idx="0"/>
-          </p:cNvCxnSpPr>
-          <p:nvPr/>
-        </p:nvCxnSpPr>
-        <p:spPr>
-          <a:xfrm>
-            <a:off x="3068820" y="771840"/>
-            <a:ext cx="355492" cy="734050"/>
-          </a:xfrm>
-          <a:prstGeom prst="straightConnector1">
-            <a:avLst/>
-          </a:prstGeom>
-          <a:ln>
-            <a:solidFill>
-              <a:srgbClr val="000000"/>
-            </a:solidFill>
-          </a:ln>
-        </p:spPr>
-      </p:cxnSp>
-      <p:sp>
-        <p:nvSpPr>
-          <p:cNvPr id="14" name="CustomShape 2"/>
+            <a:endParaRPr lang="en-US" sz="1200" strike="noStrike" spc="-1" dirty="0" smtClean="0">
+              <a:solidFill>
+                <a:srgbClr val="000000"/>
+              </a:solidFill>
+              <a:uFill>
+                <a:solidFill>
+                  <a:srgbClr val="FFFFFF"/>
+                </a:solidFill>
+              </a:uFill>
+              <a:latin typeface="Arial"/>
+              <a:ea typeface="DejaVu Sans"/>
+            </a:endParaRPr>
+          </a:p>
+          <a:p>
+            <a:r>
+              <a:rPr lang="en-US" sz="1200" spc="-1" dirty="0" err="1" smtClean="0">
+                <a:solidFill>
+                  <a:srgbClr val="000000"/>
+                </a:solidFill>
+                <a:uFill>
+                  <a:solidFill>
+                    <a:srgbClr val="FFFFFF"/>
+                  </a:solidFill>
+                </a:uFill>
+                <a:latin typeface="Arial"/>
+                <a:ea typeface="DejaVu Sans"/>
+              </a:rPr>
+              <a:t>PitchRate</a:t>
+            </a:r>
+            <a:endParaRPr lang="en-US" sz="1200" spc="-1" dirty="0" smtClean="0">
+              <a:solidFill>
+                <a:srgbClr val="000000"/>
+              </a:solidFill>
+              <a:uFill>
+                <a:solidFill>
+                  <a:srgbClr val="FFFFFF"/>
+                </a:solidFill>
+              </a:uFill>
+              <a:latin typeface="Arial"/>
+              <a:ea typeface="DejaVu Sans"/>
+            </a:endParaRPr>
+          </a:p>
+          <a:p>
+            <a:r>
+              <a:rPr lang="en-US" sz="1200" strike="noStrike" spc="-1" dirty="0" err="1" smtClean="0">
+                <a:solidFill>
+                  <a:srgbClr val="000000"/>
+                </a:solidFill>
+                <a:uFill>
+                  <a:solidFill>
+                    <a:srgbClr val="FFFFFF"/>
+                  </a:solidFill>
+                </a:uFill>
+                <a:latin typeface="Arial"/>
+                <a:ea typeface="DejaVu Sans"/>
+              </a:rPr>
+              <a:t>YawRate</a:t>
+            </a:r>
+            <a:endParaRPr lang="en-US" sz="1200" strike="noStrike" spc="-1" dirty="0">
+              <a:solidFill>
+                <a:srgbClr val="000000"/>
+              </a:solidFill>
+              <a:uFill>
+                <a:solidFill>
+                  <a:srgbClr val="FFFFFF"/>
+                </a:solidFill>
+              </a:uFill>
+              <a:latin typeface="Arial"/>
+            </a:endParaRPr>
+          </a:p>
+        </p:txBody>
+      </p:sp>
+      <p:sp>
+        <p:nvSpPr>
+          <p:cNvPr id="15" name="CustomShape 2"/>
           <p:cNvSpPr/>
           <p:nvPr/>
         </p:nvSpPr>
         <p:spPr>
           <a:xfrm>
-            <a:off x="1380803" y="1777622"/>
+            <a:off x="2853041" y="1766122"/>
             <a:ext cx="1030073" cy="314640"/>
           </a:xfrm>
           <a:prstGeom prst="rect">
@@ -2457,99 +2491,6 @@
                 <a:latin typeface="Arial"/>
                 <a:ea typeface="DejaVu Sans"/>
               </a:rPr>
-              <a:t>RollRate</a:t>
-            </a:r>
-            <a:endParaRPr lang="en-US" sz="1200" strike="noStrike" spc="-1" dirty="0" smtClean="0">
-              <a:solidFill>
-                <a:srgbClr val="000000"/>
-              </a:solidFill>
-              <a:uFill>
-                <a:solidFill>
-                  <a:srgbClr val="FFFFFF"/>
-                </a:solidFill>
-              </a:uFill>
-              <a:latin typeface="Arial"/>
-              <a:ea typeface="DejaVu Sans"/>
-            </a:endParaRPr>
-          </a:p>
-          <a:p>
-            <a:r>
-              <a:rPr lang="en-US" sz="1200" spc="-1" dirty="0" err="1" smtClean="0">
-                <a:solidFill>
-                  <a:srgbClr val="000000"/>
-                </a:solidFill>
-                <a:uFill>
-                  <a:solidFill>
-                    <a:srgbClr val="FFFFFF"/>
-                  </a:solidFill>
-                </a:uFill>
-                <a:latin typeface="Arial"/>
-                <a:ea typeface="DejaVu Sans"/>
-              </a:rPr>
-              <a:t>PitchRate</a:t>
-            </a:r>
-            <a:endParaRPr lang="en-US" sz="1200" strike="noStrike" spc="-1" dirty="0">
-              <a:solidFill>
-                <a:srgbClr val="000000"/>
-              </a:solidFill>
-              <a:uFill>
-                <a:solidFill>
-                  <a:srgbClr val="FFFFFF"/>
-                </a:solidFill>
-              </a:uFill>
-              <a:latin typeface="Arial"/>
-            </a:endParaRPr>
-          </a:p>
-        </p:txBody>
-      </p:sp>
-      <p:sp>
-        <p:nvSpPr>
-          <p:cNvPr id="15" name="CustomShape 2"/>
-          <p:cNvSpPr/>
-          <p:nvPr/>
-        </p:nvSpPr>
-        <p:spPr>
-          <a:xfrm>
-            <a:off x="2275072" y="1766122"/>
-            <a:ext cx="1030073" cy="314640"/>
-          </a:xfrm>
-          <a:prstGeom prst="rect">
-            <a:avLst/>
-          </a:prstGeom>
-          <a:noFill/>
-          <a:ln>
-            <a:noFill/>
-          </a:ln>
-        </p:spPr>
-        <p:style>
-          <a:lnRef idx="0">
-            <a:scrgbClr r="0" g="0" b="0"/>
-          </a:lnRef>
-          <a:fillRef idx="0">
-            <a:scrgbClr r="0" g="0" b="0"/>
-          </a:fillRef>
-          <a:effectRef idx="0">
-            <a:scrgbClr r="0" g="0" b="0"/>
-          </a:effectRef>
-          <a:fontRef idx="minor"/>
-        </p:style>
-        <p:txBody>
-          <a:bodyPr lIns="90000" tIns="45000" rIns="90000" bIns="45000"/>
-          <a:lstStyle/>
-          <a:p>
-            <a:r>
-              <a:rPr lang="en-US" sz="1200" strike="noStrike" spc="-1" dirty="0" err="1" smtClean="0">
-                <a:solidFill>
-                  <a:srgbClr val="000000"/>
-                </a:solidFill>
-                <a:uFill>
-                  <a:solidFill>
-                    <a:srgbClr val="FFFFFF"/>
-                  </a:solidFill>
-                </a:uFill>
-                <a:latin typeface="Arial"/>
-                <a:ea typeface="DejaVu Sans"/>
-              </a:rPr>
               <a:t>RollAngle</a:t>
             </a:r>
             <a:endParaRPr lang="en-US" sz="1200" strike="noStrike" spc="-1" dirty="0" smtClean="0">
@@ -2580,70 +2521,6 @@
                 <a:ea typeface="DejaVu Sans"/>
               </a:rPr>
               <a:t>PitchAngle</a:t>
-            </a:r>
-            <a:endParaRPr lang="en-US" sz="1200" strike="noStrike" spc="-1" dirty="0">
-              <a:solidFill>
-                <a:srgbClr val="000000"/>
-              </a:solidFill>
-              <a:uFill>
-                <a:solidFill>
-                  <a:srgbClr val="FFFFFF"/>
-                </a:solidFill>
-              </a:uFill>
-              <a:latin typeface="Arial"/>
-            </a:endParaRPr>
-          </a:p>
-        </p:txBody>
-      </p:sp>
-      <p:sp>
-        <p:nvSpPr>
-          <p:cNvPr id="16" name="CustomShape 2"/>
-          <p:cNvSpPr/>
-          <p:nvPr/>
-        </p:nvSpPr>
-        <p:spPr>
-          <a:xfrm>
-            <a:off x="3232609" y="1757502"/>
-            <a:ext cx="1030073" cy="314640"/>
-          </a:xfrm>
-          <a:prstGeom prst="rect">
-            <a:avLst/>
-          </a:prstGeom>
-          <a:noFill/>
-          <a:ln>
-            <a:noFill/>
-          </a:ln>
-        </p:spPr>
-        <p:style>
-          <a:lnRef idx="0">
-            <a:scrgbClr r="0" g="0" b="0"/>
-          </a:lnRef>
-          <a:fillRef idx="0">
-            <a:scrgbClr r="0" g="0" b="0"/>
-          </a:fillRef>
-          <a:effectRef idx="0">
-            <a:scrgbClr r="0" g="0" b="0"/>
-          </a:effectRef>
-          <a:fontRef idx="minor"/>
-        </p:style>
-        <p:txBody>
-          <a:bodyPr lIns="90000" tIns="45000" rIns="90000" bIns="45000"/>
-          <a:lstStyle/>
-          <a:p>
-            <a:r>
-              <a:rPr lang="en-US" sz="1200" strike="noStrike" spc="-1" dirty="0" err="1" smtClean="0">
-                <a:solidFill>
-                  <a:srgbClr val="000000"/>
-                </a:solidFill>
-                <a:uFill>
-                  <a:solidFill>
-                    <a:srgbClr val="FFFFFF"/>
-                  </a:solidFill>
-                </a:uFill>
-                <a:latin typeface="Arial"/>
-                <a:ea typeface="DejaVu Sans"/>
-              </a:rPr>
-              <a:t>YawRate</a:t>
             </a:r>
             <a:endParaRPr lang="en-US" sz="1200" strike="noStrike" spc="-1" dirty="0">
               <a:solidFill>

</xml_diff>

<commit_message>
More PID controller info
</commit_message>
<xml_diff>
--- a/extras/media/pidcontrollers.pptx
+++ b/extras/media/pidcontrollers.pptx
@@ -2536,6 +2536,264 @@
           </a:p>
         </p:txBody>
       </p:sp>
+      <p:sp>
+        <p:nvSpPr>
+          <p:cNvPr id="2" name="Rectangle 1"/>
+          <p:cNvSpPr/>
+          <p:nvPr/>
+        </p:nvSpPr>
+        <p:spPr>
+          <a:xfrm>
+            <a:off x="741872" y="974785"/>
+            <a:ext cx="4425351" cy="2268747"/>
+          </a:xfrm>
+          <a:prstGeom prst="rect">
+            <a:avLst/>
+          </a:prstGeom>
+          <a:noFill/>
+          <a:ln>
+            <a:solidFill>
+              <a:schemeClr val="bg1">
+                <a:lumMod val="50000"/>
+              </a:schemeClr>
+            </a:solidFill>
+          </a:ln>
+        </p:spPr>
+        <p:style>
+          <a:lnRef idx="2">
+            <a:schemeClr val="accent1">
+              <a:shade val="50000"/>
+            </a:schemeClr>
+          </a:lnRef>
+          <a:fillRef idx="1">
+            <a:schemeClr val="accent1"/>
+          </a:fillRef>
+          <a:effectRef idx="0">
+            <a:schemeClr val="accent1"/>
+          </a:effectRef>
+          <a:fontRef idx="minor">
+            <a:schemeClr val="lt1"/>
+          </a:fontRef>
+        </p:style>
+        <p:txBody>
+          <a:bodyPr rtlCol="0" anchor="ctr"/>
+          <a:lstStyle/>
+          <a:p>
+            <a:pPr algn="ctr"/>
+            <a:endParaRPr lang="en-US"/>
+          </a:p>
+        </p:txBody>
+      </p:sp>
+      <p:sp>
+        <p:nvSpPr>
+          <p:cNvPr id="3" name="Rectangle 2"/>
+          <p:cNvSpPr/>
+          <p:nvPr/>
+        </p:nvSpPr>
+        <p:spPr>
+          <a:xfrm>
+            <a:off x="4224889" y="2894372"/>
+            <a:ext cx="991553" cy="369332"/>
+          </a:xfrm>
+          <a:prstGeom prst="rect">
+            <a:avLst/>
+          </a:prstGeom>
+        </p:spPr>
+        <p:txBody>
+          <a:bodyPr wrap="none">
+            <a:spAutoFit/>
+          </a:bodyPr>
+          <a:lstStyle/>
+          <a:p>
+            <a:r>
+              <a:rPr lang="en-US" spc="-1" dirty="0" smtClean="0">
+                <a:solidFill>
+                  <a:srgbClr val="000000"/>
+                </a:solidFill>
+                <a:uFill>
+                  <a:solidFill>
+                    <a:srgbClr val="FFFFFF"/>
+                  </a:solidFill>
+                </a:uFill>
+              </a:rPr>
+              <a:t>Alt Hold</a:t>
+            </a:r>
+            <a:endParaRPr lang="en-US" dirty="0"/>
+          </a:p>
+        </p:txBody>
+      </p:sp>
+      <p:sp>
+        <p:nvSpPr>
+          <p:cNvPr id="13" name="Rectangle 12"/>
+          <p:cNvSpPr/>
+          <p:nvPr/>
+        </p:nvSpPr>
+        <p:spPr>
+          <a:xfrm>
+            <a:off x="894272" y="1354347"/>
+            <a:ext cx="3091131" cy="1682151"/>
+          </a:xfrm>
+          <a:prstGeom prst="rect">
+            <a:avLst/>
+          </a:prstGeom>
+          <a:noFill/>
+          <a:ln>
+            <a:solidFill>
+              <a:schemeClr val="bg1">
+                <a:lumMod val="50000"/>
+              </a:schemeClr>
+            </a:solidFill>
+          </a:ln>
+        </p:spPr>
+        <p:style>
+          <a:lnRef idx="2">
+            <a:schemeClr val="accent1">
+              <a:shade val="50000"/>
+            </a:schemeClr>
+          </a:lnRef>
+          <a:fillRef idx="1">
+            <a:schemeClr val="accent1"/>
+          </a:fillRef>
+          <a:effectRef idx="0">
+            <a:schemeClr val="accent1"/>
+          </a:effectRef>
+          <a:fontRef idx="minor">
+            <a:schemeClr val="lt1"/>
+          </a:fontRef>
+        </p:style>
+        <p:txBody>
+          <a:bodyPr rtlCol="0" anchor="ctr"/>
+          <a:lstStyle/>
+          <a:p>
+            <a:pPr algn="ctr"/>
+            <a:endParaRPr lang="en-US"/>
+          </a:p>
+        </p:txBody>
+      </p:sp>
+      <p:sp>
+        <p:nvSpPr>
+          <p:cNvPr id="4" name="Rectangle 3"/>
+          <p:cNvSpPr/>
+          <p:nvPr/>
+        </p:nvSpPr>
+        <p:spPr>
+          <a:xfrm>
+            <a:off x="2952678" y="2709706"/>
+            <a:ext cx="1055545" cy="369332"/>
+          </a:xfrm>
+          <a:prstGeom prst="rect">
+            <a:avLst/>
+          </a:prstGeom>
+        </p:spPr>
+        <p:txBody>
+          <a:bodyPr wrap="none">
+            <a:spAutoFit/>
+          </a:bodyPr>
+          <a:lstStyle/>
+          <a:p>
+            <a:r>
+              <a:rPr lang="en-US" spc="-1" dirty="0" smtClean="0">
+                <a:solidFill>
+                  <a:srgbClr val="000000"/>
+                </a:solidFill>
+                <a:uFill>
+                  <a:solidFill>
+                    <a:srgbClr val="FFFFFF"/>
+                  </a:solidFill>
+                </a:uFill>
+              </a:rPr>
+              <a:t>Stabilize</a:t>
+            </a:r>
+            <a:endParaRPr lang="en-US" dirty="0"/>
+          </a:p>
+        </p:txBody>
+      </p:sp>
+      <p:sp>
+        <p:nvSpPr>
+          <p:cNvPr id="16" name="Rectangle 15"/>
+          <p:cNvSpPr/>
+          <p:nvPr/>
+        </p:nvSpPr>
+        <p:spPr>
+          <a:xfrm>
+            <a:off x="1046672" y="1506747"/>
+            <a:ext cx="1620693" cy="1367453"/>
+          </a:xfrm>
+          <a:prstGeom prst="rect">
+            <a:avLst/>
+          </a:prstGeom>
+          <a:noFill/>
+          <a:ln>
+            <a:solidFill>
+              <a:schemeClr val="bg1">
+                <a:lumMod val="50000"/>
+              </a:schemeClr>
+            </a:solidFill>
+          </a:ln>
+        </p:spPr>
+        <p:style>
+          <a:lnRef idx="2">
+            <a:schemeClr val="accent1">
+              <a:shade val="50000"/>
+            </a:schemeClr>
+          </a:lnRef>
+          <a:fillRef idx="1">
+            <a:schemeClr val="accent1"/>
+          </a:fillRef>
+          <a:effectRef idx="0">
+            <a:schemeClr val="accent1"/>
+          </a:effectRef>
+          <a:fontRef idx="minor">
+            <a:schemeClr val="lt1"/>
+          </a:fontRef>
+        </p:style>
+        <p:txBody>
+          <a:bodyPr rtlCol="0" anchor="ctr"/>
+          <a:lstStyle/>
+          <a:p>
+            <a:pPr algn="ctr"/>
+            <a:endParaRPr lang="en-US"/>
+          </a:p>
+        </p:txBody>
+      </p:sp>
+      <p:sp>
+        <p:nvSpPr>
+          <p:cNvPr id="17" name="Rectangle 16"/>
+          <p:cNvSpPr/>
+          <p:nvPr/>
+        </p:nvSpPr>
+        <p:spPr>
+          <a:xfrm>
+            <a:off x="2048119" y="2525040"/>
+            <a:ext cx="658642" cy="369332"/>
+          </a:xfrm>
+          <a:prstGeom prst="rect">
+            <a:avLst/>
+          </a:prstGeom>
+        </p:spPr>
+        <p:txBody>
+          <a:bodyPr wrap="none">
+            <a:spAutoFit/>
+          </a:bodyPr>
+          <a:lstStyle/>
+          <a:p>
+            <a:r>
+              <a:rPr lang="en-US" spc="-1" dirty="0" err="1" smtClean="0">
+                <a:solidFill>
+                  <a:srgbClr val="000000"/>
+                </a:solidFill>
+                <a:uFill>
+                  <a:solidFill>
+                    <a:srgbClr val="FFFFFF"/>
+                  </a:solidFill>
+                </a:uFill>
+              </a:rPr>
+              <a:t>Acro</a:t>
+            </a:r>
+            <a:endParaRPr lang="en-US" dirty="0"/>
+          </a:p>
+        </p:txBody>
+      </p:sp>
     </p:spTree>
   </p:cSld>
   <p:clrMapOvr>

</xml_diff>